<commit_message>
added Azure UG slide
</commit_message>
<xml_diff>
--- a/2018/06-June/MeetingAgenda.pptx
+++ b/2018/06-June/MeetingAgenda.pptx
@@ -5,15 +5,17 @@
     <p:sldMasterId id="2147483648" r:id="rId1"/>
     <p:sldMasterId id="2147483660" r:id="rId2"/>
     <p:sldMasterId id="2147483672" r:id="rId3"/>
+    <p:sldMasterId id="2147483684" r:id="rId4"/>
   </p:sldMasterIdLst>
   <p:sldIdLst>
-    <p:sldId id="256" r:id="rId4"/>
-    <p:sldId id="262" r:id="rId5"/>
-    <p:sldId id="277" r:id="rId6"/>
-    <p:sldId id="287" r:id="rId7"/>
-    <p:sldId id="288" r:id="rId8"/>
-    <p:sldId id="285" r:id="rId9"/>
-    <p:sldId id="290" r:id="rId10"/>
+    <p:sldId id="256" r:id="rId5"/>
+    <p:sldId id="262" r:id="rId6"/>
+    <p:sldId id="277" r:id="rId7"/>
+    <p:sldId id="287" r:id="rId8"/>
+    <p:sldId id="288" r:id="rId9"/>
+    <p:sldId id="292" r:id="rId10"/>
+    <p:sldId id="285" r:id="rId11"/>
+    <p:sldId id="290" r:id="rId12"/>
   </p:sldIdLst>
   <p:sldSz cx="12192000" cy="6858000"/>
   <p:notesSz cx="6858000" cy="9144000"/>
@@ -5647,6 +5649,1517 @@
 </p:sldLayout>
 </file>
 
+<file path=ppt/slideLayouts/slideLayout34.xml><?xml version="1.0" encoding="utf-8"?>
+<p:sldLayout xmlns:a="http://schemas.openxmlformats.org/drawingml/2006/main" xmlns:r="http://schemas.openxmlformats.org/officeDocument/2006/relationships" xmlns:p="http://schemas.openxmlformats.org/presentationml/2006/main" type="title" preserve="1">
+  <p:cSld name="Title Slide">
+    <p:spTree>
+      <p:nvGrpSpPr>
+        <p:cNvPr id="1" name=""/>
+        <p:cNvGrpSpPr/>
+        <p:nvPr/>
+      </p:nvGrpSpPr>
+      <p:grpSpPr>
+        <a:xfrm>
+          <a:off x="0" y="0"/>
+          <a:ext cx="0" cy="0"/>
+          <a:chOff x="0" y="0"/>
+          <a:chExt cx="0" cy="0"/>
+        </a:xfrm>
+      </p:grpSpPr>
+      <p:sp>
+        <p:nvSpPr>
+          <p:cNvPr id="2" name="Title 1">
+            <a:extLst>
+              <a:ext uri="{FF2B5EF4-FFF2-40B4-BE49-F238E27FC236}">
+                <a16:creationId xmlns:a16="http://schemas.microsoft.com/office/drawing/2014/main" id="{38F7F8B4-88E2-47C1-B21F-FF05028749B1}"/>
+              </a:ext>
+            </a:extLst>
+          </p:cNvPr>
+          <p:cNvSpPr>
+            <a:spLocks noGrp="1"/>
+          </p:cNvSpPr>
+          <p:nvPr>
+            <p:ph type="ctrTitle"/>
+          </p:nvPr>
+        </p:nvSpPr>
+        <p:spPr>
+          <a:xfrm>
+            <a:off x="1524000" y="1122363"/>
+            <a:ext cx="9144000" cy="2387600"/>
+          </a:xfrm>
+        </p:spPr>
+        <p:txBody>
+          <a:bodyPr anchor="b"/>
+          <a:lstStyle>
+            <a:lvl1pPr algn="ctr">
+              <a:defRPr sz="6000"/>
+            </a:lvl1pPr>
+          </a:lstStyle>
+          <a:p>
+            <a:r>
+              <a:rPr lang="en-US"/>
+              <a:t>Click to edit Master title style</a:t>
+            </a:r>
+          </a:p>
+        </p:txBody>
+      </p:sp>
+      <p:sp>
+        <p:nvSpPr>
+          <p:cNvPr id="3" name="Subtitle 2">
+            <a:extLst>
+              <a:ext uri="{FF2B5EF4-FFF2-40B4-BE49-F238E27FC236}">
+                <a16:creationId xmlns:a16="http://schemas.microsoft.com/office/drawing/2014/main" id="{92124B45-C365-485B-92D2-9F675CE4FA75}"/>
+              </a:ext>
+            </a:extLst>
+          </p:cNvPr>
+          <p:cNvSpPr>
+            <a:spLocks noGrp="1"/>
+          </p:cNvSpPr>
+          <p:nvPr>
+            <p:ph type="subTitle" idx="1"/>
+          </p:nvPr>
+        </p:nvSpPr>
+        <p:spPr>
+          <a:xfrm>
+            <a:off x="1524000" y="3602038"/>
+            <a:ext cx="9144000" cy="1655762"/>
+          </a:xfrm>
+        </p:spPr>
+        <p:txBody>
+          <a:bodyPr/>
+          <a:lstStyle>
+            <a:lvl1pPr marL="0" indent="0" algn="ctr">
+              <a:buNone/>
+              <a:defRPr sz="2400"/>
+            </a:lvl1pPr>
+            <a:lvl2pPr marL="457200" indent="0" algn="ctr">
+              <a:buNone/>
+              <a:defRPr sz="2000"/>
+            </a:lvl2pPr>
+            <a:lvl3pPr marL="914400" indent="0" algn="ctr">
+              <a:buNone/>
+              <a:defRPr sz="1800"/>
+            </a:lvl3pPr>
+            <a:lvl4pPr marL="1371600" indent="0" algn="ctr">
+              <a:buNone/>
+              <a:defRPr sz="1600"/>
+            </a:lvl4pPr>
+            <a:lvl5pPr marL="1828800" indent="0" algn="ctr">
+              <a:buNone/>
+              <a:defRPr sz="1600"/>
+            </a:lvl5pPr>
+            <a:lvl6pPr marL="2286000" indent="0" algn="ctr">
+              <a:buNone/>
+              <a:defRPr sz="1600"/>
+            </a:lvl6pPr>
+            <a:lvl7pPr marL="2743200" indent="0" algn="ctr">
+              <a:buNone/>
+              <a:defRPr sz="1600"/>
+            </a:lvl7pPr>
+            <a:lvl8pPr marL="3200400" indent="0" algn="ctr">
+              <a:buNone/>
+              <a:defRPr sz="1600"/>
+            </a:lvl8pPr>
+            <a:lvl9pPr marL="3657600" indent="0" algn="ctr">
+              <a:buNone/>
+              <a:defRPr sz="1600"/>
+            </a:lvl9pPr>
+          </a:lstStyle>
+          <a:p>
+            <a:r>
+              <a:rPr lang="en-US"/>
+              <a:t>Click to edit Master subtitle style</a:t>
+            </a:r>
+          </a:p>
+        </p:txBody>
+      </p:sp>
+      <p:sp>
+        <p:nvSpPr>
+          <p:cNvPr id="4" name="Date Placeholder 3">
+            <a:extLst>
+              <a:ext uri="{FF2B5EF4-FFF2-40B4-BE49-F238E27FC236}">
+                <a16:creationId xmlns:a16="http://schemas.microsoft.com/office/drawing/2014/main" id="{F451063A-82AE-419C-BADD-78B7BE81E5F1}"/>
+              </a:ext>
+            </a:extLst>
+          </p:cNvPr>
+          <p:cNvSpPr>
+            <a:spLocks noGrp="1"/>
+          </p:cNvSpPr>
+          <p:nvPr>
+            <p:ph type="dt" sz="half" idx="10"/>
+          </p:nvPr>
+        </p:nvSpPr>
+        <p:spPr/>
+        <p:txBody>
+          <a:bodyPr/>
+          <a:lstStyle/>
+          <a:p>
+            <a:fld id="{1F0BD816-9A3A-4BB3-9BB4-7DC3AD6D52E8}" type="datetimeFigureOut">
+              <a:rPr lang="en-US" smtClean="0"/>
+              <a:t>6/27/2018</a:t>
+            </a:fld>
+            <a:endParaRPr lang="en-US"/>
+          </a:p>
+        </p:txBody>
+      </p:sp>
+      <p:sp>
+        <p:nvSpPr>
+          <p:cNvPr id="5" name="Footer Placeholder 4">
+            <a:extLst>
+              <a:ext uri="{FF2B5EF4-FFF2-40B4-BE49-F238E27FC236}">
+                <a16:creationId xmlns:a16="http://schemas.microsoft.com/office/drawing/2014/main" id="{2E102233-4F3B-4292-A306-F72C533620B5}"/>
+              </a:ext>
+            </a:extLst>
+          </p:cNvPr>
+          <p:cNvSpPr>
+            <a:spLocks noGrp="1"/>
+          </p:cNvSpPr>
+          <p:nvPr>
+            <p:ph type="ftr" sz="quarter" idx="11"/>
+          </p:nvPr>
+        </p:nvSpPr>
+        <p:spPr/>
+        <p:txBody>
+          <a:bodyPr/>
+          <a:lstStyle/>
+          <a:p>
+            <a:endParaRPr lang="en-US"/>
+          </a:p>
+        </p:txBody>
+      </p:sp>
+      <p:sp>
+        <p:nvSpPr>
+          <p:cNvPr id="6" name="Slide Number Placeholder 5">
+            <a:extLst>
+              <a:ext uri="{FF2B5EF4-FFF2-40B4-BE49-F238E27FC236}">
+                <a16:creationId xmlns:a16="http://schemas.microsoft.com/office/drawing/2014/main" id="{01D8DB7D-776C-49D2-A883-24C04D524173}"/>
+              </a:ext>
+            </a:extLst>
+          </p:cNvPr>
+          <p:cNvSpPr>
+            <a:spLocks noGrp="1"/>
+          </p:cNvSpPr>
+          <p:nvPr>
+            <p:ph type="sldNum" sz="quarter" idx="12"/>
+          </p:nvPr>
+        </p:nvSpPr>
+        <p:spPr/>
+        <p:txBody>
+          <a:bodyPr/>
+          <a:lstStyle/>
+          <a:p>
+            <a:fld id="{991A58A3-3A43-45C0-9C4A-B69A740D0EFF}" type="slidenum">
+              <a:rPr lang="en-US" smtClean="0"/>
+              <a:t>‹#›</a:t>
+            </a:fld>
+            <a:endParaRPr lang="en-US"/>
+          </a:p>
+        </p:txBody>
+      </p:sp>
+    </p:spTree>
+    <p:extLst>
+      <p:ext uri="{BB962C8B-B14F-4D97-AF65-F5344CB8AC3E}">
+        <p14:creationId xmlns:p14="http://schemas.microsoft.com/office/powerpoint/2010/main" val="1494517291"/>
+      </p:ext>
+    </p:extLst>
+  </p:cSld>
+  <p:clrMapOvr>
+    <a:masterClrMapping/>
+  </p:clrMapOvr>
+</p:sldLayout>
+</file>
+
+<file path=ppt/slideLayouts/slideLayout35.xml><?xml version="1.0" encoding="utf-8"?>
+<p:sldLayout xmlns:a="http://schemas.openxmlformats.org/drawingml/2006/main" xmlns:r="http://schemas.openxmlformats.org/officeDocument/2006/relationships" xmlns:p="http://schemas.openxmlformats.org/presentationml/2006/main" type="obj" preserve="1">
+  <p:cSld name="Title and Content">
+    <p:spTree>
+      <p:nvGrpSpPr>
+        <p:cNvPr id="1" name=""/>
+        <p:cNvGrpSpPr/>
+        <p:nvPr/>
+      </p:nvGrpSpPr>
+      <p:grpSpPr>
+        <a:xfrm>
+          <a:off x="0" y="0"/>
+          <a:ext cx="0" cy="0"/>
+          <a:chOff x="0" y="0"/>
+          <a:chExt cx="0" cy="0"/>
+        </a:xfrm>
+      </p:grpSpPr>
+      <p:sp>
+        <p:nvSpPr>
+          <p:cNvPr id="2" name="Title 1">
+            <a:extLst>
+              <a:ext uri="{FF2B5EF4-FFF2-40B4-BE49-F238E27FC236}">
+                <a16:creationId xmlns:a16="http://schemas.microsoft.com/office/drawing/2014/main" id="{640CC3AD-4D06-4137-A370-84763C1FF6A1}"/>
+              </a:ext>
+            </a:extLst>
+          </p:cNvPr>
+          <p:cNvSpPr>
+            <a:spLocks noGrp="1"/>
+          </p:cNvSpPr>
+          <p:nvPr>
+            <p:ph type="title"/>
+          </p:nvPr>
+        </p:nvSpPr>
+        <p:spPr/>
+        <p:txBody>
+          <a:bodyPr/>
+          <a:lstStyle/>
+          <a:p>
+            <a:r>
+              <a:rPr lang="en-US"/>
+              <a:t>Click to edit Master title style</a:t>
+            </a:r>
+          </a:p>
+        </p:txBody>
+      </p:sp>
+      <p:sp>
+        <p:nvSpPr>
+          <p:cNvPr id="3" name="Content Placeholder 2">
+            <a:extLst>
+              <a:ext uri="{FF2B5EF4-FFF2-40B4-BE49-F238E27FC236}">
+                <a16:creationId xmlns:a16="http://schemas.microsoft.com/office/drawing/2014/main" id="{6C6179CC-394A-464E-A5A7-9A9D29EA143E}"/>
+              </a:ext>
+            </a:extLst>
+          </p:cNvPr>
+          <p:cNvSpPr>
+            <a:spLocks noGrp="1"/>
+          </p:cNvSpPr>
+          <p:nvPr>
+            <p:ph idx="1"/>
+          </p:nvPr>
+        </p:nvSpPr>
+        <p:spPr/>
+        <p:txBody>
+          <a:bodyPr/>
+          <a:lstStyle/>
+          <a:p>
+            <a:pPr lvl="0"/>
+            <a:r>
+              <a:rPr lang="en-US"/>
+              <a:t>Edit Master text styles</a:t>
+            </a:r>
+          </a:p>
+          <a:p>
+            <a:pPr lvl="1"/>
+            <a:r>
+              <a:rPr lang="en-US"/>
+              <a:t>Second level</a:t>
+            </a:r>
+          </a:p>
+          <a:p>
+            <a:pPr lvl="2"/>
+            <a:r>
+              <a:rPr lang="en-US"/>
+              <a:t>Third level</a:t>
+            </a:r>
+          </a:p>
+          <a:p>
+            <a:pPr lvl="3"/>
+            <a:r>
+              <a:rPr lang="en-US"/>
+              <a:t>Fourth level</a:t>
+            </a:r>
+          </a:p>
+          <a:p>
+            <a:pPr lvl="4"/>
+            <a:r>
+              <a:rPr lang="en-US"/>
+              <a:t>Fifth level</a:t>
+            </a:r>
+          </a:p>
+        </p:txBody>
+      </p:sp>
+      <p:sp>
+        <p:nvSpPr>
+          <p:cNvPr id="4" name="Date Placeholder 3">
+            <a:extLst>
+              <a:ext uri="{FF2B5EF4-FFF2-40B4-BE49-F238E27FC236}">
+                <a16:creationId xmlns:a16="http://schemas.microsoft.com/office/drawing/2014/main" id="{F821F153-97EB-4683-AFF0-E6C2A7597C98}"/>
+              </a:ext>
+            </a:extLst>
+          </p:cNvPr>
+          <p:cNvSpPr>
+            <a:spLocks noGrp="1"/>
+          </p:cNvSpPr>
+          <p:nvPr>
+            <p:ph type="dt" sz="half" idx="10"/>
+          </p:nvPr>
+        </p:nvSpPr>
+        <p:spPr/>
+        <p:txBody>
+          <a:bodyPr/>
+          <a:lstStyle/>
+          <a:p>
+            <a:fld id="{1F0BD816-9A3A-4BB3-9BB4-7DC3AD6D52E8}" type="datetimeFigureOut">
+              <a:rPr lang="en-US" smtClean="0"/>
+              <a:t>6/27/2018</a:t>
+            </a:fld>
+            <a:endParaRPr lang="en-US"/>
+          </a:p>
+        </p:txBody>
+      </p:sp>
+      <p:sp>
+        <p:nvSpPr>
+          <p:cNvPr id="5" name="Footer Placeholder 4">
+            <a:extLst>
+              <a:ext uri="{FF2B5EF4-FFF2-40B4-BE49-F238E27FC236}">
+                <a16:creationId xmlns:a16="http://schemas.microsoft.com/office/drawing/2014/main" id="{0C607787-1795-4C7F-A182-28E497716782}"/>
+              </a:ext>
+            </a:extLst>
+          </p:cNvPr>
+          <p:cNvSpPr>
+            <a:spLocks noGrp="1"/>
+          </p:cNvSpPr>
+          <p:nvPr>
+            <p:ph type="ftr" sz="quarter" idx="11"/>
+          </p:nvPr>
+        </p:nvSpPr>
+        <p:spPr/>
+        <p:txBody>
+          <a:bodyPr/>
+          <a:lstStyle/>
+          <a:p>
+            <a:endParaRPr lang="en-US"/>
+          </a:p>
+        </p:txBody>
+      </p:sp>
+      <p:sp>
+        <p:nvSpPr>
+          <p:cNvPr id="6" name="Slide Number Placeholder 5">
+            <a:extLst>
+              <a:ext uri="{FF2B5EF4-FFF2-40B4-BE49-F238E27FC236}">
+                <a16:creationId xmlns:a16="http://schemas.microsoft.com/office/drawing/2014/main" id="{325C6253-E6D7-4853-90FF-412F2D06C09B}"/>
+              </a:ext>
+            </a:extLst>
+          </p:cNvPr>
+          <p:cNvSpPr>
+            <a:spLocks noGrp="1"/>
+          </p:cNvSpPr>
+          <p:nvPr>
+            <p:ph type="sldNum" sz="quarter" idx="12"/>
+          </p:nvPr>
+        </p:nvSpPr>
+        <p:spPr/>
+        <p:txBody>
+          <a:bodyPr/>
+          <a:lstStyle/>
+          <a:p>
+            <a:fld id="{991A58A3-3A43-45C0-9C4A-B69A740D0EFF}" type="slidenum">
+              <a:rPr lang="en-US" smtClean="0"/>
+              <a:t>‹#›</a:t>
+            </a:fld>
+            <a:endParaRPr lang="en-US"/>
+          </a:p>
+        </p:txBody>
+      </p:sp>
+    </p:spTree>
+    <p:extLst>
+      <p:ext uri="{BB962C8B-B14F-4D97-AF65-F5344CB8AC3E}">
+        <p14:creationId xmlns:p14="http://schemas.microsoft.com/office/powerpoint/2010/main" val="1325920172"/>
+      </p:ext>
+    </p:extLst>
+  </p:cSld>
+  <p:clrMapOvr>
+    <a:masterClrMapping/>
+  </p:clrMapOvr>
+</p:sldLayout>
+</file>
+
+<file path=ppt/slideLayouts/slideLayout36.xml><?xml version="1.0" encoding="utf-8"?>
+<p:sldLayout xmlns:a="http://schemas.openxmlformats.org/drawingml/2006/main" xmlns:r="http://schemas.openxmlformats.org/officeDocument/2006/relationships" xmlns:p="http://schemas.openxmlformats.org/presentationml/2006/main" type="secHead" preserve="1">
+  <p:cSld name="Section Header">
+    <p:spTree>
+      <p:nvGrpSpPr>
+        <p:cNvPr id="1" name=""/>
+        <p:cNvGrpSpPr/>
+        <p:nvPr/>
+      </p:nvGrpSpPr>
+      <p:grpSpPr>
+        <a:xfrm>
+          <a:off x="0" y="0"/>
+          <a:ext cx="0" cy="0"/>
+          <a:chOff x="0" y="0"/>
+          <a:chExt cx="0" cy="0"/>
+        </a:xfrm>
+      </p:grpSpPr>
+      <p:sp>
+        <p:nvSpPr>
+          <p:cNvPr id="2" name="Title 1">
+            <a:extLst>
+              <a:ext uri="{FF2B5EF4-FFF2-40B4-BE49-F238E27FC236}">
+                <a16:creationId xmlns:a16="http://schemas.microsoft.com/office/drawing/2014/main" id="{A65E9AA8-50E4-4BFD-A04F-1224280F7378}"/>
+              </a:ext>
+            </a:extLst>
+          </p:cNvPr>
+          <p:cNvSpPr>
+            <a:spLocks noGrp="1"/>
+          </p:cNvSpPr>
+          <p:nvPr>
+            <p:ph type="title"/>
+          </p:nvPr>
+        </p:nvSpPr>
+        <p:spPr>
+          <a:xfrm>
+            <a:off x="831850" y="1709738"/>
+            <a:ext cx="10515600" cy="2852737"/>
+          </a:xfrm>
+        </p:spPr>
+        <p:txBody>
+          <a:bodyPr anchor="b"/>
+          <a:lstStyle>
+            <a:lvl1pPr>
+              <a:defRPr sz="6000"/>
+            </a:lvl1pPr>
+          </a:lstStyle>
+          <a:p>
+            <a:r>
+              <a:rPr lang="en-US"/>
+              <a:t>Click to edit Master title style</a:t>
+            </a:r>
+          </a:p>
+        </p:txBody>
+      </p:sp>
+      <p:sp>
+        <p:nvSpPr>
+          <p:cNvPr id="3" name="Text Placeholder 2">
+            <a:extLst>
+              <a:ext uri="{FF2B5EF4-FFF2-40B4-BE49-F238E27FC236}">
+                <a16:creationId xmlns:a16="http://schemas.microsoft.com/office/drawing/2014/main" id="{FA910960-0ED9-4C28-8CE8-9907D5EAC902}"/>
+              </a:ext>
+            </a:extLst>
+          </p:cNvPr>
+          <p:cNvSpPr>
+            <a:spLocks noGrp="1"/>
+          </p:cNvSpPr>
+          <p:nvPr>
+            <p:ph type="body" idx="1"/>
+          </p:nvPr>
+        </p:nvSpPr>
+        <p:spPr>
+          <a:xfrm>
+            <a:off x="831850" y="4589463"/>
+            <a:ext cx="10515600" cy="1500187"/>
+          </a:xfrm>
+        </p:spPr>
+        <p:txBody>
+          <a:bodyPr/>
+          <a:lstStyle>
+            <a:lvl1pPr marL="0" indent="0">
+              <a:buNone/>
+              <a:defRPr sz="2400">
+                <a:solidFill>
+                  <a:schemeClr val="tx1">
+                    <a:tint val="75000"/>
+                  </a:schemeClr>
+                </a:solidFill>
+              </a:defRPr>
+            </a:lvl1pPr>
+            <a:lvl2pPr marL="457200" indent="0">
+              <a:buNone/>
+              <a:defRPr sz="2000">
+                <a:solidFill>
+                  <a:schemeClr val="tx1">
+                    <a:tint val="75000"/>
+                  </a:schemeClr>
+                </a:solidFill>
+              </a:defRPr>
+            </a:lvl2pPr>
+            <a:lvl3pPr marL="914400" indent="0">
+              <a:buNone/>
+              <a:defRPr sz="1800">
+                <a:solidFill>
+                  <a:schemeClr val="tx1">
+                    <a:tint val="75000"/>
+                  </a:schemeClr>
+                </a:solidFill>
+              </a:defRPr>
+            </a:lvl3pPr>
+            <a:lvl4pPr marL="1371600" indent="0">
+              <a:buNone/>
+              <a:defRPr sz="1600">
+                <a:solidFill>
+                  <a:schemeClr val="tx1">
+                    <a:tint val="75000"/>
+                  </a:schemeClr>
+                </a:solidFill>
+              </a:defRPr>
+            </a:lvl4pPr>
+            <a:lvl5pPr marL="1828800" indent="0">
+              <a:buNone/>
+              <a:defRPr sz="1600">
+                <a:solidFill>
+                  <a:schemeClr val="tx1">
+                    <a:tint val="75000"/>
+                  </a:schemeClr>
+                </a:solidFill>
+              </a:defRPr>
+            </a:lvl5pPr>
+            <a:lvl6pPr marL="2286000" indent="0">
+              <a:buNone/>
+              <a:defRPr sz="1600">
+                <a:solidFill>
+                  <a:schemeClr val="tx1">
+                    <a:tint val="75000"/>
+                  </a:schemeClr>
+                </a:solidFill>
+              </a:defRPr>
+            </a:lvl6pPr>
+            <a:lvl7pPr marL="2743200" indent="0">
+              <a:buNone/>
+              <a:defRPr sz="1600">
+                <a:solidFill>
+                  <a:schemeClr val="tx1">
+                    <a:tint val="75000"/>
+                  </a:schemeClr>
+                </a:solidFill>
+              </a:defRPr>
+            </a:lvl7pPr>
+            <a:lvl8pPr marL="3200400" indent="0">
+              <a:buNone/>
+              <a:defRPr sz="1600">
+                <a:solidFill>
+                  <a:schemeClr val="tx1">
+                    <a:tint val="75000"/>
+                  </a:schemeClr>
+                </a:solidFill>
+              </a:defRPr>
+            </a:lvl8pPr>
+            <a:lvl9pPr marL="3657600" indent="0">
+              <a:buNone/>
+              <a:defRPr sz="1600">
+                <a:solidFill>
+                  <a:schemeClr val="tx1">
+                    <a:tint val="75000"/>
+                  </a:schemeClr>
+                </a:solidFill>
+              </a:defRPr>
+            </a:lvl9pPr>
+          </a:lstStyle>
+          <a:p>
+            <a:pPr lvl="0"/>
+            <a:r>
+              <a:rPr lang="en-US"/>
+              <a:t>Edit Master text styles</a:t>
+            </a:r>
+          </a:p>
+        </p:txBody>
+      </p:sp>
+      <p:sp>
+        <p:nvSpPr>
+          <p:cNvPr id="4" name="Date Placeholder 3">
+            <a:extLst>
+              <a:ext uri="{FF2B5EF4-FFF2-40B4-BE49-F238E27FC236}">
+                <a16:creationId xmlns:a16="http://schemas.microsoft.com/office/drawing/2014/main" id="{F099C6FE-417C-49DA-BB61-3F1B0AE5F629}"/>
+              </a:ext>
+            </a:extLst>
+          </p:cNvPr>
+          <p:cNvSpPr>
+            <a:spLocks noGrp="1"/>
+          </p:cNvSpPr>
+          <p:nvPr>
+            <p:ph type="dt" sz="half" idx="10"/>
+          </p:nvPr>
+        </p:nvSpPr>
+        <p:spPr/>
+        <p:txBody>
+          <a:bodyPr/>
+          <a:lstStyle/>
+          <a:p>
+            <a:fld id="{1F0BD816-9A3A-4BB3-9BB4-7DC3AD6D52E8}" type="datetimeFigureOut">
+              <a:rPr lang="en-US" smtClean="0"/>
+              <a:t>6/27/2018</a:t>
+            </a:fld>
+            <a:endParaRPr lang="en-US"/>
+          </a:p>
+        </p:txBody>
+      </p:sp>
+      <p:sp>
+        <p:nvSpPr>
+          <p:cNvPr id="5" name="Footer Placeholder 4">
+            <a:extLst>
+              <a:ext uri="{FF2B5EF4-FFF2-40B4-BE49-F238E27FC236}">
+                <a16:creationId xmlns:a16="http://schemas.microsoft.com/office/drawing/2014/main" id="{08240B5E-E64A-49BD-AEDA-0285673671B1}"/>
+              </a:ext>
+            </a:extLst>
+          </p:cNvPr>
+          <p:cNvSpPr>
+            <a:spLocks noGrp="1"/>
+          </p:cNvSpPr>
+          <p:nvPr>
+            <p:ph type="ftr" sz="quarter" idx="11"/>
+          </p:nvPr>
+        </p:nvSpPr>
+        <p:spPr/>
+        <p:txBody>
+          <a:bodyPr/>
+          <a:lstStyle/>
+          <a:p>
+            <a:endParaRPr lang="en-US"/>
+          </a:p>
+        </p:txBody>
+      </p:sp>
+      <p:sp>
+        <p:nvSpPr>
+          <p:cNvPr id="6" name="Slide Number Placeholder 5">
+            <a:extLst>
+              <a:ext uri="{FF2B5EF4-FFF2-40B4-BE49-F238E27FC236}">
+                <a16:creationId xmlns:a16="http://schemas.microsoft.com/office/drawing/2014/main" id="{CF951FB8-5305-44B2-B276-3E07D8758B68}"/>
+              </a:ext>
+            </a:extLst>
+          </p:cNvPr>
+          <p:cNvSpPr>
+            <a:spLocks noGrp="1"/>
+          </p:cNvSpPr>
+          <p:nvPr>
+            <p:ph type="sldNum" sz="quarter" idx="12"/>
+          </p:nvPr>
+        </p:nvSpPr>
+        <p:spPr/>
+        <p:txBody>
+          <a:bodyPr/>
+          <a:lstStyle/>
+          <a:p>
+            <a:fld id="{991A58A3-3A43-45C0-9C4A-B69A740D0EFF}" type="slidenum">
+              <a:rPr lang="en-US" smtClean="0"/>
+              <a:t>‹#›</a:t>
+            </a:fld>
+            <a:endParaRPr lang="en-US"/>
+          </a:p>
+        </p:txBody>
+      </p:sp>
+    </p:spTree>
+    <p:extLst>
+      <p:ext uri="{BB962C8B-B14F-4D97-AF65-F5344CB8AC3E}">
+        <p14:creationId xmlns:p14="http://schemas.microsoft.com/office/powerpoint/2010/main" val="2148812913"/>
+      </p:ext>
+    </p:extLst>
+  </p:cSld>
+  <p:clrMapOvr>
+    <a:masterClrMapping/>
+  </p:clrMapOvr>
+</p:sldLayout>
+</file>
+
+<file path=ppt/slideLayouts/slideLayout37.xml><?xml version="1.0" encoding="utf-8"?>
+<p:sldLayout xmlns:a="http://schemas.openxmlformats.org/drawingml/2006/main" xmlns:r="http://schemas.openxmlformats.org/officeDocument/2006/relationships" xmlns:p="http://schemas.openxmlformats.org/presentationml/2006/main" type="twoObj" preserve="1">
+  <p:cSld name="Two Content">
+    <p:spTree>
+      <p:nvGrpSpPr>
+        <p:cNvPr id="1" name=""/>
+        <p:cNvGrpSpPr/>
+        <p:nvPr/>
+      </p:nvGrpSpPr>
+      <p:grpSpPr>
+        <a:xfrm>
+          <a:off x="0" y="0"/>
+          <a:ext cx="0" cy="0"/>
+          <a:chOff x="0" y="0"/>
+          <a:chExt cx="0" cy="0"/>
+        </a:xfrm>
+      </p:grpSpPr>
+      <p:sp>
+        <p:nvSpPr>
+          <p:cNvPr id="2" name="Title 1">
+            <a:extLst>
+              <a:ext uri="{FF2B5EF4-FFF2-40B4-BE49-F238E27FC236}">
+                <a16:creationId xmlns:a16="http://schemas.microsoft.com/office/drawing/2014/main" id="{4F3DC563-8458-4532-B516-0B9EE428923A}"/>
+              </a:ext>
+            </a:extLst>
+          </p:cNvPr>
+          <p:cNvSpPr>
+            <a:spLocks noGrp="1"/>
+          </p:cNvSpPr>
+          <p:nvPr>
+            <p:ph type="title"/>
+          </p:nvPr>
+        </p:nvSpPr>
+        <p:spPr/>
+        <p:txBody>
+          <a:bodyPr/>
+          <a:lstStyle/>
+          <a:p>
+            <a:r>
+              <a:rPr lang="en-US"/>
+              <a:t>Click to edit Master title style</a:t>
+            </a:r>
+          </a:p>
+        </p:txBody>
+      </p:sp>
+      <p:sp>
+        <p:nvSpPr>
+          <p:cNvPr id="3" name="Content Placeholder 2">
+            <a:extLst>
+              <a:ext uri="{FF2B5EF4-FFF2-40B4-BE49-F238E27FC236}">
+                <a16:creationId xmlns:a16="http://schemas.microsoft.com/office/drawing/2014/main" id="{E2BE1F94-54DC-4BD8-A383-C3C7544F7401}"/>
+              </a:ext>
+            </a:extLst>
+          </p:cNvPr>
+          <p:cNvSpPr>
+            <a:spLocks noGrp="1"/>
+          </p:cNvSpPr>
+          <p:nvPr>
+            <p:ph sz="half" idx="1"/>
+          </p:nvPr>
+        </p:nvSpPr>
+        <p:spPr>
+          <a:xfrm>
+            <a:off x="838200" y="1825625"/>
+            <a:ext cx="5181600" cy="4351338"/>
+          </a:xfrm>
+        </p:spPr>
+        <p:txBody>
+          <a:bodyPr/>
+          <a:lstStyle/>
+          <a:p>
+            <a:pPr lvl="0"/>
+            <a:r>
+              <a:rPr lang="en-US"/>
+              <a:t>Edit Master text styles</a:t>
+            </a:r>
+          </a:p>
+          <a:p>
+            <a:pPr lvl="1"/>
+            <a:r>
+              <a:rPr lang="en-US"/>
+              <a:t>Second level</a:t>
+            </a:r>
+          </a:p>
+          <a:p>
+            <a:pPr lvl="2"/>
+            <a:r>
+              <a:rPr lang="en-US"/>
+              <a:t>Third level</a:t>
+            </a:r>
+          </a:p>
+          <a:p>
+            <a:pPr lvl="3"/>
+            <a:r>
+              <a:rPr lang="en-US"/>
+              <a:t>Fourth level</a:t>
+            </a:r>
+          </a:p>
+          <a:p>
+            <a:pPr lvl="4"/>
+            <a:r>
+              <a:rPr lang="en-US"/>
+              <a:t>Fifth level</a:t>
+            </a:r>
+          </a:p>
+        </p:txBody>
+      </p:sp>
+      <p:sp>
+        <p:nvSpPr>
+          <p:cNvPr id="4" name="Content Placeholder 3">
+            <a:extLst>
+              <a:ext uri="{FF2B5EF4-FFF2-40B4-BE49-F238E27FC236}">
+                <a16:creationId xmlns:a16="http://schemas.microsoft.com/office/drawing/2014/main" id="{81F18439-584B-4B9C-8ADD-679F521BD91B}"/>
+              </a:ext>
+            </a:extLst>
+          </p:cNvPr>
+          <p:cNvSpPr>
+            <a:spLocks noGrp="1"/>
+          </p:cNvSpPr>
+          <p:nvPr>
+            <p:ph sz="half" idx="2"/>
+          </p:nvPr>
+        </p:nvSpPr>
+        <p:spPr>
+          <a:xfrm>
+            <a:off x="6172200" y="1825625"/>
+            <a:ext cx="5181600" cy="4351338"/>
+          </a:xfrm>
+        </p:spPr>
+        <p:txBody>
+          <a:bodyPr/>
+          <a:lstStyle/>
+          <a:p>
+            <a:pPr lvl="0"/>
+            <a:r>
+              <a:rPr lang="en-US"/>
+              <a:t>Edit Master text styles</a:t>
+            </a:r>
+          </a:p>
+          <a:p>
+            <a:pPr lvl="1"/>
+            <a:r>
+              <a:rPr lang="en-US"/>
+              <a:t>Second level</a:t>
+            </a:r>
+          </a:p>
+          <a:p>
+            <a:pPr lvl="2"/>
+            <a:r>
+              <a:rPr lang="en-US"/>
+              <a:t>Third level</a:t>
+            </a:r>
+          </a:p>
+          <a:p>
+            <a:pPr lvl="3"/>
+            <a:r>
+              <a:rPr lang="en-US"/>
+              <a:t>Fourth level</a:t>
+            </a:r>
+          </a:p>
+          <a:p>
+            <a:pPr lvl="4"/>
+            <a:r>
+              <a:rPr lang="en-US"/>
+              <a:t>Fifth level</a:t>
+            </a:r>
+          </a:p>
+        </p:txBody>
+      </p:sp>
+      <p:sp>
+        <p:nvSpPr>
+          <p:cNvPr id="5" name="Date Placeholder 4">
+            <a:extLst>
+              <a:ext uri="{FF2B5EF4-FFF2-40B4-BE49-F238E27FC236}">
+                <a16:creationId xmlns:a16="http://schemas.microsoft.com/office/drawing/2014/main" id="{93893BB2-0C0D-4D99-9938-801A54A78E17}"/>
+              </a:ext>
+            </a:extLst>
+          </p:cNvPr>
+          <p:cNvSpPr>
+            <a:spLocks noGrp="1"/>
+          </p:cNvSpPr>
+          <p:nvPr>
+            <p:ph type="dt" sz="half" idx="10"/>
+          </p:nvPr>
+        </p:nvSpPr>
+        <p:spPr/>
+        <p:txBody>
+          <a:bodyPr/>
+          <a:lstStyle/>
+          <a:p>
+            <a:fld id="{1F0BD816-9A3A-4BB3-9BB4-7DC3AD6D52E8}" type="datetimeFigureOut">
+              <a:rPr lang="en-US" smtClean="0"/>
+              <a:t>6/27/2018</a:t>
+            </a:fld>
+            <a:endParaRPr lang="en-US"/>
+          </a:p>
+        </p:txBody>
+      </p:sp>
+      <p:sp>
+        <p:nvSpPr>
+          <p:cNvPr id="6" name="Footer Placeholder 5">
+            <a:extLst>
+              <a:ext uri="{FF2B5EF4-FFF2-40B4-BE49-F238E27FC236}">
+                <a16:creationId xmlns:a16="http://schemas.microsoft.com/office/drawing/2014/main" id="{1D4BDBAF-D336-472D-8DBC-E1884A3F7A5D}"/>
+              </a:ext>
+            </a:extLst>
+          </p:cNvPr>
+          <p:cNvSpPr>
+            <a:spLocks noGrp="1"/>
+          </p:cNvSpPr>
+          <p:nvPr>
+            <p:ph type="ftr" sz="quarter" idx="11"/>
+          </p:nvPr>
+        </p:nvSpPr>
+        <p:spPr/>
+        <p:txBody>
+          <a:bodyPr/>
+          <a:lstStyle/>
+          <a:p>
+            <a:endParaRPr lang="en-US"/>
+          </a:p>
+        </p:txBody>
+      </p:sp>
+      <p:sp>
+        <p:nvSpPr>
+          <p:cNvPr id="7" name="Slide Number Placeholder 6">
+            <a:extLst>
+              <a:ext uri="{FF2B5EF4-FFF2-40B4-BE49-F238E27FC236}">
+                <a16:creationId xmlns:a16="http://schemas.microsoft.com/office/drawing/2014/main" id="{E6FD5C13-FB97-45E5-97FB-FACB14758557}"/>
+              </a:ext>
+            </a:extLst>
+          </p:cNvPr>
+          <p:cNvSpPr>
+            <a:spLocks noGrp="1"/>
+          </p:cNvSpPr>
+          <p:nvPr>
+            <p:ph type="sldNum" sz="quarter" idx="12"/>
+          </p:nvPr>
+        </p:nvSpPr>
+        <p:spPr/>
+        <p:txBody>
+          <a:bodyPr/>
+          <a:lstStyle/>
+          <a:p>
+            <a:fld id="{991A58A3-3A43-45C0-9C4A-B69A740D0EFF}" type="slidenum">
+              <a:rPr lang="en-US" smtClean="0"/>
+              <a:t>‹#›</a:t>
+            </a:fld>
+            <a:endParaRPr lang="en-US"/>
+          </a:p>
+        </p:txBody>
+      </p:sp>
+    </p:spTree>
+    <p:extLst>
+      <p:ext uri="{BB962C8B-B14F-4D97-AF65-F5344CB8AC3E}">
+        <p14:creationId xmlns:p14="http://schemas.microsoft.com/office/powerpoint/2010/main" val="189189936"/>
+      </p:ext>
+    </p:extLst>
+  </p:cSld>
+  <p:clrMapOvr>
+    <a:masterClrMapping/>
+  </p:clrMapOvr>
+</p:sldLayout>
+</file>
+
+<file path=ppt/slideLayouts/slideLayout38.xml><?xml version="1.0" encoding="utf-8"?>
+<p:sldLayout xmlns:a="http://schemas.openxmlformats.org/drawingml/2006/main" xmlns:r="http://schemas.openxmlformats.org/officeDocument/2006/relationships" xmlns:p="http://schemas.openxmlformats.org/presentationml/2006/main" type="twoTxTwoObj" preserve="1">
+  <p:cSld name="Comparison">
+    <p:spTree>
+      <p:nvGrpSpPr>
+        <p:cNvPr id="1" name=""/>
+        <p:cNvGrpSpPr/>
+        <p:nvPr/>
+      </p:nvGrpSpPr>
+      <p:grpSpPr>
+        <a:xfrm>
+          <a:off x="0" y="0"/>
+          <a:ext cx="0" cy="0"/>
+          <a:chOff x="0" y="0"/>
+          <a:chExt cx="0" cy="0"/>
+        </a:xfrm>
+      </p:grpSpPr>
+      <p:sp>
+        <p:nvSpPr>
+          <p:cNvPr id="2" name="Title 1">
+            <a:extLst>
+              <a:ext uri="{FF2B5EF4-FFF2-40B4-BE49-F238E27FC236}">
+                <a16:creationId xmlns:a16="http://schemas.microsoft.com/office/drawing/2014/main" id="{F43C2F98-6A74-472A-A433-75FC7FFF414D}"/>
+              </a:ext>
+            </a:extLst>
+          </p:cNvPr>
+          <p:cNvSpPr>
+            <a:spLocks noGrp="1"/>
+          </p:cNvSpPr>
+          <p:nvPr>
+            <p:ph type="title"/>
+          </p:nvPr>
+        </p:nvSpPr>
+        <p:spPr>
+          <a:xfrm>
+            <a:off x="839788" y="365125"/>
+            <a:ext cx="10515600" cy="1325563"/>
+          </a:xfrm>
+        </p:spPr>
+        <p:txBody>
+          <a:bodyPr/>
+          <a:lstStyle/>
+          <a:p>
+            <a:r>
+              <a:rPr lang="en-US"/>
+              <a:t>Click to edit Master title style</a:t>
+            </a:r>
+          </a:p>
+        </p:txBody>
+      </p:sp>
+      <p:sp>
+        <p:nvSpPr>
+          <p:cNvPr id="3" name="Text Placeholder 2">
+            <a:extLst>
+              <a:ext uri="{FF2B5EF4-FFF2-40B4-BE49-F238E27FC236}">
+                <a16:creationId xmlns:a16="http://schemas.microsoft.com/office/drawing/2014/main" id="{F3BD90E2-1201-4187-92AF-486D60922A02}"/>
+              </a:ext>
+            </a:extLst>
+          </p:cNvPr>
+          <p:cNvSpPr>
+            <a:spLocks noGrp="1"/>
+          </p:cNvSpPr>
+          <p:nvPr>
+            <p:ph type="body" idx="1"/>
+          </p:nvPr>
+        </p:nvSpPr>
+        <p:spPr>
+          <a:xfrm>
+            <a:off x="839788" y="1681163"/>
+            <a:ext cx="5157787" cy="823912"/>
+          </a:xfrm>
+        </p:spPr>
+        <p:txBody>
+          <a:bodyPr anchor="b"/>
+          <a:lstStyle>
+            <a:lvl1pPr marL="0" indent="0">
+              <a:buNone/>
+              <a:defRPr sz="2400" b="1"/>
+            </a:lvl1pPr>
+            <a:lvl2pPr marL="457200" indent="0">
+              <a:buNone/>
+              <a:defRPr sz="2000" b="1"/>
+            </a:lvl2pPr>
+            <a:lvl3pPr marL="914400" indent="0">
+              <a:buNone/>
+              <a:defRPr sz="1800" b="1"/>
+            </a:lvl3pPr>
+            <a:lvl4pPr marL="1371600" indent="0">
+              <a:buNone/>
+              <a:defRPr sz="1600" b="1"/>
+            </a:lvl4pPr>
+            <a:lvl5pPr marL="1828800" indent="0">
+              <a:buNone/>
+              <a:defRPr sz="1600" b="1"/>
+            </a:lvl5pPr>
+            <a:lvl6pPr marL="2286000" indent="0">
+              <a:buNone/>
+              <a:defRPr sz="1600" b="1"/>
+            </a:lvl6pPr>
+            <a:lvl7pPr marL="2743200" indent="0">
+              <a:buNone/>
+              <a:defRPr sz="1600" b="1"/>
+            </a:lvl7pPr>
+            <a:lvl8pPr marL="3200400" indent="0">
+              <a:buNone/>
+              <a:defRPr sz="1600" b="1"/>
+            </a:lvl8pPr>
+            <a:lvl9pPr marL="3657600" indent="0">
+              <a:buNone/>
+              <a:defRPr sz="1600" b="1"/>
+            </a:lvl9pPr>
+          </a:lstStyle>
+          <a:p>
+            <a:pPr lvl="0"/>
+            <a:r>
+              <a:rPr lang="en-US"/>
+              <a:t>Edit Master text styles</a:t>
+            </a:r>
+          </a:p>
+        </p:txBody>
+      </p:sp>
+      <p:sp>
+        <p:nvSpPr>
+          <p:cNvPr id="4" name="Content Placeholder 3">
+            <a:extLst>
+              <a:ext uri="{FF2B5EF4-FFF2-40B4-BE49-F238E27FC236}">
+                <a16:creationId xmlns:a16="http://schemas.microsoft.com/office/drawing/2014/main" id="{54945AC9-61BC-484D-9BD5-5414B4D5CF41}"/>
+              </a:ext>
+            </a:extLst>
+          </p:cNvPr>
+          <p:cNvSpPr>
+            <a:spLocks noGrp="1"/>
+          </p:cNvSpPr>
+          <p:nvPr>
+            <p:ph sz="half" idx="2"/>
+          </p:nvPr>
+        </p:nvSpPr>
+        <p:spPr>
+          <a:xfrm>
+            <a:off x="839788" y="2505075"/>
+            <a:ext cx="5157787" cy="3684588"/>
+          </a:xfrm>
+        </p:spPr>
+        <p:txBody>
+          <a:bodyPr/>
+          <a:lstStyle/>
+          <a:p>
+            <a:pPr lvl="0"/>
+            <a:r>
+              <a:rPr lang="en-US"/>
+              <a:t>Edit Master text styles</a:t>
+            </a:r>
+          </a:p>
+          <a:p>
+            <a:pPr lvl="1"/>
+            <a:r>
+              <a:rPr lang="en-US"/>
+              <a:t>Second level</a:t>
+            </a:r>
+          </a:p>
+          <a:p>
+            <a:pPr lvl="2"/>
+            <a:r>
+              <a:rPr lang="en-US"/>
+              <a:t>Third level</a:t>
+            </a:r>
+          </a:p>
+          <a:p>
+            <a:pPr lvl="3"/>
+            <a:r>
+              <a:rPr lang="en-US"/>
+              <a:t>Fourth level</a:t>
+            </a:r>
+          </a:p>
+          <a:p>
+            <a:pPr lvl="4"/>
+            <a:r>
+              <a:rPr lang="en-US"/>
+              <a:t>Fifth level</a:t>
+            </a:r>
+          </a:p>
+        </p:txBody>
+      </p:sp>
+      <p:sp>
+        <p:nvSpPr>
+          <p:cNvPr id="5" name="Text Placeholder 4">
+            <a:extLst>
+              <a:ext uri="{FF2B5EF4-FFF2-40B4-BE49-F238E27FC236}">
+                <a16:creationId xmlns:a16="http://schemas.microsoft.com/office/drawing/2014/main" id="{9F9E0542-B3A4-4226-98FE-C3E1F6CFEB7A}"/>
+              </a:ext>
+            </a:extLst>
+          </p:cNvPr>
+          <p:cNvSpPr>
+            <a:spLocks noGrp="1"/>
+          </p:cNvSpPr>
+          <p:nvPr>
+            <p:ph type="body" sz="quarter" idx="3"/>
+          </p:nvPr>
+        </p:nvSpPr>
+        <p:spPr>
+          <a:xfrm>
+            <a:off x="6172200" y="1681163"/>
+            <a:ext cx="5183188" cy="823912"/>
+          </a:xfrm>
+        </p:spPr>
+        <p:txBody>
+          <a:bodyPr anchor="b"/>
+          <a:lstStyle>
+            <a:lvl1pPr marL="0" indent="0">
+              <a:buNone/>
+              <a:defRPr sz="2400" b="1"/>
+            </a:lvl1pPr>
+            <a:lvl2pPr marL="457200" indent="0">
+              <a:buNone/>
+              <a:defRPr sz="2000" b="1"/>
+            </a:lvl2pPr>
+            <a:lvl3pPr marL="914400" indent="0">
+              <a:buNone/>
+              <a:defRPr sz="1800" b="1"/>
+            </a:lvl3pPr>
+            <a:lvl4pPr marL="1371600" indent="0">
+              <a:buNone/>
+              <a:defRPr sz="1600" b="1"/>
+            </a:lvl4pPr>
+            <a:lvl5pPr marL="1828800" indent="0">
+              <a:buNone/>
+              <a:defRPr sz="1600" b="1"/>
+            </a:lvl5pPr>
+            <a:lvl6pPr marL="2286000" indent="0">
+              <a:buNone/>
+              <a:defRPr sz="1600" b="1"/>
+            </a:lvl6pPr>
+            <a:lvl7pPr marL="2743200" indent="0">
+              <a:buNone/>
+              <a:defRPr sz="1600" b="1"/>
+            </a:lvl7pPr>
+            <a:lvl8pPr marL="3200400" indent="0">
+              <a:buNone/>
+              <a:defRPr sz="1600" b="1"/>
+            </a:lvl8pPr>
+            <a:lvl9pPr marL="3657600" indent="0">
+              <a:buNone/>
+              <a:defRPr sz="1600" b="1"/>
+            </a:lvl9pPr>
+          </a:lstStyle>
+          <a:p>
+            <a:pPr lvl="0"/>
+            <a:r>
+              <a:rPr lang="en-US"/>
+              <a:t>Edit Master text styles</a:t>
+            </a:r>
+          </a:p>
+        </p:txBody>
+      </p:sp>
+      <p:sp>
+        <p:nvSpPr>
+          <p:cNvPr id="6" name="Content Placeholder 5">
+            <a:extLst>
+              <a:ext uri="{FF2B5EF4-FFF2-40B4-BE49-F238E27FC236}">
+                <a16:creationId xmlns:a16="http://schemas.microsoft.com/office/drawing/2014/main" id="{90E1AD81-E741-4E9D-9077-F02B001FA3DD}"/>
+              </a:ext>
+            </a:extLst>
+          </p:cNvPr>
+          <p:cNvSpPr>
+            <a:spLocks noGrp="1"/>
+          </p:cNvSpPr>
+          <p:nvPr>
+            <p:ph sz="quarter" idx="4"/>
+          </p:nvPr>
+        </p:nvSpPr>
+        <p:spPr>
+          <a:xfrm>
+            <a:off x="6172200" y="2505075"/>
+            <a:ext cx="5183188" cy="3684588"/>
+          </a:xfrm>
+        </p:spPr>
+        <p:txBody>
+          <a:bodyPr/>
+          <a:lstStyle/>
+          <a:p>
+            <a:pPr lvl="0"/>
+            <a:r>
+              <a:rPr lang="en-US"/>
+              <a:t>Edit Master text styles</a:t>
+            </a:r>
+          </a:p>
+          <a:p>
+            <a:pPr lvl="1"/>
+            <a:r>
+              <a:rPr lang="en-US"/>
+              <a:t>Second level</a:t>
+            </a:r>
+          </a:p>
+          <a:p>
+            <a:pPr lvl="2"/>
+            <a:r>
+              <a:rPr lang="en-US"/>
+              <a:t>Third level</a:t>
+            </a:r>
+          </a:p>
+          <a:p>
+            <a:pPr lvl="3"/>
+            <a:r>
+              <a:rPr lang="en-US"/>
+              <a:t>Fourth level</a:t>
+            </a:r>
+          </a:p>
+          <a:p>
+            <a:pPr lvl="4"/>
+            <a:r>
+              <a:rPr lang="en-US"/>
+              <a:t>Fifth level</a:t>
+            </a:r>
+          </a:p>
+        </p:txBody>
+      </p:sp>
+      <p:sp>
+        <p:nvSpPr>
+          <p:cNvPr id="7" name="Date Placeholder 6">
+            <a:extLst>
+              <a:ext uri="{FF2B5EF4-FFF2-40B4-BE49-F238E27FC236}">
+                <a16:creationId xmlns:a16="http://schemas.microsoft.com/office/drawing/2014/main" id="{44C646EA-DFF6-4D3F-A81B-B56B3D24EC9A}"/>
+              </a:ext>
+            </a:extLst>
+          </p:cNvPr>
+          <p:cNvSpPr>
+            <a:spLocks noGrp="1"/>
+          </p:cNvSpPr>
+          <p:nvPr>
+            <p:ph type="dt" sz="half" idx="10"/>
+          </p:nvPr>
+        </p:nvSpPr>
+        <p:spPr/>
+        <p:txBody>
+          <a:bodyPr/>
+          <a:lstStyle/>
+          <a:p>
+            <a:fld id="{1F0BD816-9A3A-4BB3-9BB4-7DC3AD6D52E8}" type="datetimeFigureOut">
+              <a:rPr lang="en-US" smtClean="0"/>
+              <a:t>6/27/2018</a:t>
+            </a:fld>
+            <a:endParaRPr lang="en-US"/>
+          </a:p>
+        </p:txBody>
+      </p:sp>
+      <p:sp>
+        <p:nvSpPr>
+          <p:cNvPr id="8" name="Footer Placeholder 7">
+            <a:extLst>
+              <a:ext uri="{FF2B5EF4-FFF2-40B4-BE49-F238E27FC236}">
+                <a16:creationId xmlns:a16="http://schemas.microsoft.com/office/drawing/2014/main" id="{83D86950-DC75-45B3-A653-24D925DAB8D0}"/>
+              </a:ext>
+            </a:extLst>
+          </p:cNvPr>
+          <p:cNvSpPr>
+            <a:spLocks noGrp="1"/>
+          </p:cNvSpPr>
+          <p:nvPr>
+            <p:ph type="ftr" sz="quarter" idx="11"/>
+          </p:nvPr>
+        </p:nvSpPr>
+        <p:spPr/>
+        <p:txBody>
+          <a:bodyPr/>
+          <a:lstStyle/>
+          <a:p>
+            <a:endParaRPr lang="en-US"/>
+          </a:p>
+        </p:txBody>
+      </p:sp>
+      <p:sp>
+        <p:nvSpPr>
+          <p:cNvPr id="9" name="Slide Number Placeholder 8">
+            <a:extLst>
+              <a:ext uri="{FF2B5EF4-FFF2-40B4-BE49-F238E27FC236}">
+                <a16:creationId xmlns:a16="http://schemas.microsoft.com/office/drawing/2014/main" id="{07114D46-014B-4744-8B40-CB4432643203}"/>
+              </a:ext>
+            </a:extLst>
+          </p:cNvPr>
+          <p:cNvSpPr>
+            <a:spLocks noGrp="1"/>
+          </p:cNvSpPr>
+          <p:nvPr>
+            <p:ph type="sldNum" sz="quarter" idx="12"/>
+          </p:nvPr>
+        </p:nvSpPr>
+        <p:spPr/>
+        <p:txBody>
+          <a:bodyPr/>
+          <a:lstStyle/>
+          <a:p>
+            <a:fld id="{991A58A3-3A43-45C0-9C4A-B69A740D0EFF}" type="slidenum">
+              <a:rPr lang="en-US" smtClean="0"/>
+              <a:t>‹#›</a:t>
+            </a:fld>
+            <a:endParaRPr lang="en-US"/>
+          </a:p>
+        </p:txBody>
+      </p:sp>
+    </p:spTree>
+    <p:extLst>
+      <p:ext uri="{BB962C8B-B14F-4D97-AF65-F5344CB8AC3E}">
+        <p14:creationId xmlns:p14="http://schemas.microsoft.com/office/powerpoint/2010/main" val="3972865791"/>
+      </p:ext>
+    </p:extLst>
+  </p:cSld>
+  <p:clrMapOvr>
+    <a:masterClrMapping/>
+  </p:clrMapOvr>
+</p:sldLayout>
+</file>
+
+<file path=ppt/slideLayouts/slideLayout39.xml><?xml version="1.0" encoding="utf-8"?>
+<p:sldLayout xmlns:a="http://schemas.openxmlformats.org/drawingml/2006/main" xmlns:r="http://schemas.openxmlformats.org/officeDocument/2006/relationships" xmlns:p="http://schemas.openxmlformats.org/presentationml/2006/main" type="titleOnly" preserve="1">
+  <p:cSld name="Title Only">
+    <p:spTree>
+      <p:nvGrpSpPr>
+        <p:cNvPr id="1" name=""/>
+        <p:cNvGrpSpPr/>
+        <p:nvPr/>
+      </p:nvGrpSpPr>
+      <p:grpSpPr>
+        <a:xfrm>
+          <a:off x="0" y="0"/>
+          <a:ext cx="0" cy="0"/>
+          <a:chOff x="0" y="0"/>
+          <a:chExt cx="0" cy="0"/>
+        </a:xfrm>
+      </p:grpSpPr>
+      <p:sp>
+        <p:nvSpPr>
+          <p:cNvPr id="2" name="Title 1">
+            <a:extLst>
+              <a:ext uri="{FF2B5EF4-FFF2-40B4-BE49-F238E27FC236}">
+                <a16:creationId xmlns:a16="http://schemas.microsoft.com/office/drawing/2014/main" id="{30DD9BBD-D9D4-4723-BC0A-B2941BCE76FB}"/>
+              </a:ext>
+            </a:extLst>
+          </p:cNvPr>
+          <p:cNvSpPr>
+            <a:spLocks noGrp="1"/>
+          </p:cNvSpPr>
+          <p:nvPr>
+            <p:ph type="title"/>
+          </p:nvPr>
+        </p:nvSpPr>
+        <p:spPr/>
+        <p:txBody>
+          <a:bodyPr/>
+          <a:lstStyle/>
+          <a:p>
+            <a:r>
+              <a:rPr lang="en-US"/>
+              <a:t>Click to edit Master title style</a:t>
+            </a:r>
+          </a:p>
+        </p:txBody>
+      </p:sp>
+      <p:sp>
+        <p:nvSpPr>
+          <p:cNvPr id="3" name="Date Placeholder 2">
+            <a:extLst>
+              <a:ext uri="{FF2B5EF4-FFF2-40B4-BE49-F238E27FC236}">
+                <a16:creationId xmlns:a16="http://schemas.microsoft.com/office/drawing/2014/main" id="{5C0F98E2-B91A-498A-B46F-890C7B6D0A21}"/>
+              </a:ext>
+            </a:extLst>
+          </p:cNvPr>
+          <p:cNvSpPr>
+            <a:spLocks noGrp="1"/>
+          </p:cNvSpPr>
+          <p:nvPr>
+            <p:ph type="dt" sz="half" idx="10"/>
+          </p:nvPr>
+        </p:nvSpPr>
+        <p:spPr/>
+        <p:txBody>
+          <a:bodyPr/>
+          <a:lstStyle/>
+          <a:p>
+            <a:fld id="{1F0BD816-9A3A-4BB3-9BB4-7DC3AD6D52E8}" type="datetimeFigureOut">
+              <a:rPr lang="en-US" smtClean="0"/>
+              <a:t>6/27/2018</a:t>
+            </a:fld>
+            <a:endParaRPr lang="en-US"/>
+          </a:p>
+        </p:txBody>
+      </p:sp>
+      <p:sp>
+        <p:nvSpPr>
+          <p:cNvPr id="4" name="Footer Placeholder 3">
+            <a:extLst>
+              <a:ext uri="{FF2B5EF4-FFF2-40B4-BE49-F238E27FC236}">
+                <a16:creationId xmlns:a16="http://schemas.microsoft.com/office/drawing/2014/main" id="{7A0BA44E-A3B4-4E23-ABA1-4E94FEDD7DC0}"/>
+              </a:ext>
+            </a:extLst>
+          </p:cNvPr>
+          <p:cNvSpPr>
+            <a:spLocks noGrp="1"/>
+          </p:cNvSpPr>
+          <p:nvPr>
+            <p:ph type="ftr" sz="quarter" idx="11"/>
+          </p:nvPr>
+        </p:nvSpPr>
+        <p:spPr/>
+        <p:txBody>
+          <a:bodyPr/>
+          <a:lstStyle/>
+          <a:p>
+            <a:endParaRPr lang="en-US"/>
+          </a:p>
+        </p:txBody>
+      </p:sp>
+      <p:sp>
+        <p:nvSpPr>
+          <p:cNvPr id="5" name="Slide Number Placeholder 4">
+            <a:extLst>
+              <a:ext uri="{FF2B5EF4-FFF2-40B4-BE49-F238E27FC236}">
+                <a16:creationId xmlns:a16="http://schemas.microsoft.com/office/drawing/2014/main" id="{D3C0C9E4-BA74-4558-9BDF-070315EA7B3A}"/>
+              </a:ext>
+            </a:extLst>
+          </p:cNvPr>
+          <p:cNvSpPr>
+            <a:spLocks noGrp="1"/>
+          </p:cNvSpPr>
+          <p:nvPr>
+            <p:ph type="sldNum" sz="quarter" idx="12"/>
+          </p:nvPr>
+        </p:nvSpPr>
+        <p:spPr/>
+        <p:txBody>
+          <a:bodyPr/>
+          <a:lstStyle/>
+          <a:p>
+            <a:fld id="{991A58A3-3A43-45C0-9C4A-B69A740D0EFF}" type="slidenum">
+              <a:rPr lang="en-US" smtClean="0"/>
+              <a:t>‹#›</a:t>
+            </a:fld>
+            <a:endParaRPr lang="en-US"/>
+          </a:p>
+        </p:txBody>
+      </p:sp>
+    </p:spTree>
+    <p:extLst>
+      <p:ext uri="{BB962C8B-B14F-4D97-AF65-F5344CB8AC3E}">
+        <p14:creationId xmlns:p14="http://schemas.microsoft.com/office/powerpoint/2010/main" val="984996043"/>
+      </p:ext>
+    </p:extLst>
+  </p:cSld>
+  <p:clrMapOvr>
+    <a:masterClrMapping/>
+  </p:clrMapOvr>
+</p:sldLayout>
+</file>
+
 <file path=ppt/slideLayouts/slideLayout4.xml><?xml version="1.0" encoding="utf-8"?>
 <p:sldLayout xmlns:a="http://schemas.openxmlformats.org/drawingml/2006/main" xmlns:r="http://schemas.openxmlformats.org/officeDocument/2006/relationships" xmlns:p="http://schemas.openxmlformats.org/presentationml/2006/main" type="twoObj" preserve="1">
   <p:cSld name="Two Content">
@@ -5923,6 +7436,1124 @@
         </p:txBody>
       </p:sp>
     </p:spTree>
+  </p:cSld>
+  <p:clrMapOvr>
+    <a:masterClrMapping/>
+  </p:clrMapOvr>
+</p:sldLayout>
+</file>
+
+<file path=ppt/slideLayouts/slideLayout40.xml><?xml version="1.0" encoding="utf-8"?>
+<p:sldLayout xmlns:a="http://schemas.openxmlformats.org/drawingml/2006/main" xmlns:r="http://schemas.openxmlformats.org/officeDocument/2006/relationships" xmlns:p="http://schemas.openxmlformats.org/presentationml/2006/main" type="blank" preserve="1">
+  <p:cSld name="Blank">
+    <p:spTree>
+      <p:nvGrpSpPr>
+        <p:cNvPr id="1" name=""/>
+        <p:cNvGrpSpPr/>
+        <p:nvPr/>
+      </p:nvGrpSpPr>
+      <p:grpSpPr>
+        <a:xfrm>
+          <a:off x="0" y="0"/>
+          <a:ext cx="0" cy="0"/>
+          <a:chOff x="0" y="0"/>
+          <a:chExt cx="0" cy="0"/>
+        </a:xfrm>
+      </p:grpSpPr>
+      <p:sp>
+        <p:nvSpPr>
+          <p:cNvPr id="2" name="Date Placeholder 1">
+            <a:extLst>
+              <a:ext uri="{FF2B5EF4-FFF2-40B4-BE49-F238E27FC236}">
+                <a16:creationId xmlns:a16="http://schemas.microsoft.com/office/drawing/2014/main" id="{CC9AA6AA-FE38-43A1-ADE6-69767C45C1F6}"/>
+              </a:ext>
+            </a:extLst>
+          </p:cNvPr>
+          <p:cNvSpPr>
+            <a:spLocks noGrp="1"/>
+          </p:cNvSpPr>
+          <p:nvPr>
+            <p:ph type="dt" sz="half" idx="10"/>
+          </p:nvPr>
+        </p:nvSpPr>
+        <p:spPr/>
+        <p:txBody>
+          <a:bodyPr/>
+          <a:lstStyle/>
+          <a:p>
+            <a:fld id="{1F0BD816-9A3A-4BB3-9BB4-7DC3AD6D52E8}" type="datetimeFigureOut">
+              <a:rPr lang="en-US" smtClean="0"/>
+              <a:t>6/27/2018</a:t>
+            </a:fld>
+            <a:endParaRPr lang="en-US"/>
+          </a:p>
+        </p:txBody>
+      </p:sp>
+      <p:sp>
+        <p:nvSpPr>
+          <p:cNvPr id="3" name="Footer Placeholder 2">
+            <a:extLst>
+              <a:ext uri="{FF2B5EF4-FFF2-40B4-BE49-F238E27FC236}">
+                <a16:creationId xmlns:a16="http://schemas.microsoft.com/office/drawing/2014/main" id="{EEDB604A-1BE7-41B1-92E5-FF44FA922CC9}"/>
+              </a:ext>
+            </a:extLst>
+          </p:cNvPr>
+          <p:cNvSpPr>
+            <a:spLocks noGrp="1"/>
+          </p:cNvSpPr>
+          <p:nvPr>
+            <p:ph type="ftr" sz="quarter" idx="11"/>
+          </p:nvPr>
+        </p:nvSpPr>
+        <p:spPr/>
+        <p:txBody>
+          <a:bodyPr/>
+          <a:lstStyle/>
+          <a:p>
+            <a:endParaRPr lang="en-US"/>
+          </a:p>
+        </p:txBody>
+      </p:sp>
+      <p:sp>
+        <p:nvSpPr>
+          <p:cNvPr id="4" name="Slide Number Placeholder 3">
+            <a:extLst>
+              <a:ext uri="{FF2B5EF4-FFF2-40B4-BE49-F238E27FC236}">
+                <a16:creationId xmlns:a16="http://schemas.microsoft.com/office/drawing/2014/main" id="{AE55264F-C05A-416B-8453-733F468D3589}"/>
+              </a:ext>
+            </a:extLst>
+          </p:cNvPr>
+          <p:cNvSpPr>
+            <a:spLocks noGrp="1"/>
+          </p:cNvSpPr>
+          <p:nvPr>
+            <p:ph type="sldNum" sz="quarter" idx="12"/>
+          </p:nvPr>
+        </p:nvSpPr>
+        <p:spPr/>
+        <p:txBody>
+          <a:bodyPr/>
+          <a:lstStyle/>
+          <a:p>
+            <a:fld id="{991A58A3-3A43-45C0-9C4A-B69A740D0EFF}" type="slidenum">
+              <a:rPr lang="en-US" smtClean="0"/>
+              <a:t>‹#›</a:t>
+            </a:fld>
+            <a:endParaRPr lang="en-US"/>
+          </a:p>
+        </p:txBody>
+      </p:sp>
+    </p:spTree>
+    <p:extLst>
+      <p:ext uri="{BB962C8B-B14F-4D97-AF65-F5344CB8AC3E}">
+        <p14:creationId xmlns:p14="http://schemas.microsoft.com/office/powerpoint/2010/main" val="3752108933"/>
+      </p:ext>
+    </p:extLst>
+  </p:cSld>
+  <p:clrMapOvr>
+    <a:masterClrMapping/>
+  </p:clrMapOvr>
+</p:sldLayout>
+</file>
+
+<file path=ppt/slideLayouts/slideLayout41.xml><?xml version="1.0" encoding="utf-8"?>
+<p:sldLayout xmlns:a="http://schemas.openxmlformats.org/drawingml/2006/main" xmlns:r="http://schemas.openxmlformats.org/officeDocument/2006/relationships" xmlns:p="http://schemas.openxmlformats.org/presentationml/2006/main" type="objTx" preserve="1">
+  <p:cSld name="Content with Caption">
+    <p:spTree>
+      <p:nvGrpSpPr>
+        <p:cNvPr id="1" name=""/>
+        <p:cNvGrpSpPr/>
+        <p:nvPr/>
+      </p:nvGrpSpPr>
+      <p:grpSpPr>
+        <a:xfrm>
+          <a:off x="0" y="0"/>
+          <a:ext cx="0" cy="0"/>
+          <a:chOff x="0" y="0"/>
+          <a:chExt cx="0" cy="0"/>
+        </a:xfrm>
+      </p:grpSpPr>
+      <p:sp>
+        <p:nvSpPr>
+          <p:cNvPr id="2" name="Title 1">
+            <a:extLst>
+              <a:ext uri="{FF2B5EF4-FFF2-40B4-BE49-F238E27FC236}">
+                <a16:creationId xmlns:a16="http://schemas.microsoft.com/office/drawing/2014/main" id="{6C201FCB-F90F-4837-AA3A-8650BA910B40}"/>
+              </a:ext>
+            </a:extLst>
+          </p:cNvPr>
+          <p:cNvSpPr>
+            <a:spLocks noGrp="1"/>
+          </p:cNvSpPr>
+          <p:nvPr>
+            <p:ph type="title"/>
+          </p:nvPr>
+        </p:nvSpPr>
+        <p:spPr>
+          <a:xfrm>
+            <a:off x="839788" y="457200"/>
+            <a:ext cx="3932237" cy="1600200"/>
+          </a:xfrm>
+        </p:spPr>
+        <p:txBody>
+          <a:bodyPr anchor="b"/>
+          <a:lstStyle>
+            <a:lvl1pPr>
+              <a:defRPr sz="3200"/>
+            </a:lvl1pPr>
+          </a:lstStyle>
+          <a:p>
+            <a:r>
+              <a:rPr lang="en-US"/>
+              <a:t>Click to edit Master title style</a:t>
+            </a:r>
+          </a:p>
+        </p:txBody>
+      </p:sp>
+      <p:sp>
+        <p:nvSpPr>
+          <p:cNvPr id="3" name="Content Placeholder 2">
+            <a:extLst>
+              <a:ext uri="{FF2B5EF4-FFF2-40B4-BE49-F238E27FC236}">
+                <a16:creationId xmlns:a16="http://schemas.microsoft.com/office/drawing/2014/main" id="{19614E2C-C498-433C-AE45-962E4A3C2708}"/>
+              </a:ext>
+            </a:extLst>
+          </p:cNvPr>
+          <p:cNvSpPr>
+            <a:spLocks noGrp="1"/>
+          </p:cNvSpPr>
+          <p:nvPr>
+            <p:ph idx="1"/>
+          </p:nvPr>
+        </p:nvSpPr>
+        <p:spPr>
+          <a:xfrm>
+            <a:off x="5183188" y="987425"/>
+            <a:ext cx="6172200" cy="4873625"/>
+          </a:xfrm>
+        </p:spPr>
+        <p:txBody>
+          <a:bodyPr/>
+          <a:lstStyle>
+            <a:lvl1pPr>
+              <a:defRPr sz="3200"/>
+            </a:lvl1pPr>
+            <a:lvl2pPr>
+              <a:defRPr sz="2800"/>
+            </a:lvl2pPr>
+            <a:lvl3pPr>
+              <a:defRPr sz="2400"/>
+            </a:lvl3pPr>
+            <a:lvl4pPr>
+              <a:defRPr sz="2000"/>
+            </a:lvl4pPr>
+            <a:lvl5pPr>
+              <a:defRPr sz="2000"/>
+            </a:lvl5pPr>
+            <a:lvl6pPr>
+              <a:defRPr sz="2000"/>
+            </a:lvl6pPr>
+            <a:lvl7pPr>
+              <a:defRPr sz="2000"/>
+            </a:lvl7pPr>
+            <a:lvl8pPr>
+              <a:defRPr sz="2000"/>
+            </a:lvl8pPr>
+            <a:lvl9pPr>
+              <a:defRPr sz="2000"/>
+            </a:lvl9pPr>
+          </a:lstStyle>
+          <a:p>
+            <a:pPr lvl="0"/>
+            <a:r>
+              <a:rPr lang="en-US"/>
+              <a:t>Edit Master text styles</a:t>
+            </a:r>
+          </a:p>
+          <a:p>
+            <a:pPr lvl="1"/>
+            <a:r>
+              <a:rPr lang="en-US"/>
+              <a:t>Second level</a:t>
+            </a:r>
+          </a:p>
+          <a:p>
+            <a:pPr lvl="2"/>
+            <a:r>
+              <a:rPr lang="en-US"/>
+              <a:t>Third level</a:t>
+            </a:r>
+          </a:p>
+          <a:p>
+            <a:pPr lvl="3"/>
+            <a:r>
+              <a:rPr lang="en-US"/>
+              <a:t>Fourth level</a:t>
+            </a:r>
+          </a:p>
+          <a:p>
+            <a:pPr lvl="4"/>
+            <a:r>
+              <a:rPr lang="en-US"/>
+              <a:t>Fifth level</a:t>
+            </a:r>
+          </a:p>
+        </p:txBody>
+      </p:sp>
+      <p:sp>
+        <p:nvSpPr>
+          <p:cNvPr id="4" name="Text Placeholder 3">
+            <a:extLst>
+              <a:ext uri="{FF2B5EF4-FFF2-40B4-BE49-F238E27FC236}">
+                <a16:creationId xmlns:a16="http://schemas.microsoft.com/office/drawing/2014/main" id="{2A74EA32-97FE-4402-B4FF-36CF9A446AF9}"/>
+              </a:ext>
+            </a:extLst>
+          </p:cNvPr>
+          <p:cNvSpPr>
+            <a:spLocks noGrp="1"/>
+          </p:cNvSpPr>
+          <p:nvPr>
+            <p:ph type="body" sz="half" idx="2"/>
+          </p:nvPr>
+        </p:nvSpPr>
+        <p:spPr>
+          <a:xfrm>
+            <a:off x="839788" y="2057400"/>
+            <a:ext cx="3932237" cy="3811588"/>
+          </a:xfrm>
+        </p:spPr>
+        <p:txBody>
+          <a:bodyPr/>
+          <a:lstStyle>
+            <a:lvl1pPr marL="0" indent="0">
+              <a:buNone/>
+              <a:defRPr sz="1600"/>
+            </a:lvl1pPr>
+            <a:lvl2pPr marL="457200" indent="0">
+              <a:buNone/>
+              <a:defRPr sz="1400"/>
+            </a:lvl2pPr>
+            <a:lvl3pPr marL="914400" indent="0">
+              <a:buNone/>
+              <a:defRPr sz="1200"/>
+            </a:lvl3pPr>
+            <a:lvl4pPr marL="1371600" indent="0">
+              <a:buNone/>
+              <a:defRPr sz="1000"/>
+            </a:lvl4pPr>
+            <a:lvl5pPr marL="1828800" indent="0">
+              <a:buNone/>
+              <a:defRPr sz="1000"/>
+            </a:lvl5pPr>
+            <a:lvl6pPr marL="2286000" indent="0">
+              <a:buNone/>
+              <a:defRPr sz="1000"/>
+            </a:lvl6pPr>
+            <a:lvl7pPr marL="2743200" indent="0">
+              <a:buNone/>
+              <a:defRPr sz="1000"/>
+            </a:lvl7pPr>
+            <a:lvl8pPr marL="3200400" indent="0">
+              <a:buNone/>
+              <a:defRPr sz="1000"/>
+            </a:lvl8pPr>
+            <a:lvl9pPr marL="3657600" indent="0">
+              <a:buNone/>
+              <a:defRPr sz="1000"/>
+            </a:lvl9pPr>
+          </a:lstStyle>
+          <a:p>
+            <a:pPr lvl="0"/>
+            <a:r>
+              <a:rPr lang="en-US"/>
+              <a:t>Edit Master text styles</a:t>
+            </a:r>
+          </a:p>
+        </p:txBody>
+      </p:sp>
+      <p:sp>
+        <p:nvSpPr>
+          <p:cNvPr id="5" name="Date Placeholder 4">
+            <a:extLst>
+              <a:ext uri="{FF2B5EF4-FFF2-40B4-BE49-F238E27FC236}">
+                <a16:creationId xmlns:a16="http://schemas.microsoft.com/office/drawing/2014/main" id="{E322E5A3-25C0-433A-A94A-79E5E1B45DA0}"/>
+              </a:ext>
+            </a:extLst>
+          </p:cNvPr>
+          <p:cNvSpPr>
+            <a:spLocks noGrp="1"/>
+          </p:cNvSpPr>
+          <p:nvPr>
+            <p:ph type="dt" sz="half" idx="10"/>
+          </p:nvPr>
+        </p:nvSpPr>
+        <p:spPr/>
+        <p:txBody>
+          <a:bodyPr/>
+          <a:lstStyle/>
+          <a:p>
+            <a:fld id="{1F0BD816-9A3A-4BB3-9BB4-7DC3AD6D52E8}" type="datetimeFigureOut">
+              <a:rPr lang="en-US" smtClean="0"/>
+              <a:t>6/27/2018</a:t>
+            </a:fld>
+            <a:endParaRPr lang="en-US"/>
+          </a:p>
+        </p:txBody>
+      </p:sp>
+      <p:sp>
+        <p:nvSpPr>
+          <p:cNvPr id="6" name="Footer Placeholder 5">
+            <a:extLst>
+              <a:ext uri="{FF2B5EF4-FFF2-40B4-BE49-F238E27FC236}">
+                <a16:creationId xmlns:a16="http://schemas.microsoft.com/office/drawing/2014/main" id="{4E43EA85-1362-4A6C-8024-82C4EFADEC0E}"/>
+              </a:ext>
+            </a:extLst>
+          </p:cNvPr>
+          <p:cNvSpPr>
+            <a:spLocks noGrp="1"/>
+          </p:cNvSpPr>
+          <p:nvPr>
+            <p:ph type="ftr" sz="quarter" idx="11"/>
+          </p:nvPr>
+        </p:nvSpPr>
+        <p:spPr/>
+        <p:txBody>
+          <a:bodyPr/>
+          <a:lstStyle/>
+          <a:p>
+            <a:endParaRPr lang="en-US"/>
+          </a:p>
+        </p:txBody>
+      </p:sp>
+      <p:sp>
+        <p:nvSpPr>
+          <p:cNvPr id="7" name="Slide Number Placeholder 6">
+            <a:extLst>
+              <a:ext uri="{FF2B5EF4-FFF2-40B4-BE49-F238E27FC236}">
+                <a16:creationId xmlns:a16="http://schemas.microsoft.com/office/drawing/2014/main" id="{8F96E9BD-B61A-4487-A0C6-29A6C753F58E}"/>
+              </a:ext>
+            </a:extLst>
+          </p:cNvPr>
+          <p:cNvSpPr>
+            <a:spLocks noGrp="1"/>
+          </p:cNvSpPr>
+          <p:nvPr>
+            <p:ph type="sldNum" sz="quarter" idx="12"/>
+          </p:nvPr>
+        </p:nvSpPr>
+        <p:spPr/>
+        <p:txBody>
+          <a:bodyPr/>
+          <a:lstStyle/>
+          <a:p>
+            <a:fld id="{991A58A3-3A43-45C0-9C4A-B69A740D0EFF}" type="slidenum">
+              <a:rPr lang="en-US" smtClean="0"/>
+              <a:t>‹#›</a:t>
+            </a:fld>
+            <a:endParaRPr lang="en-US"/>
+          </a:p>
+        </p:txBody>
+      </p:sp>
+    </p:spTree>
+    <p:extLst>
+      <p:ext uri="{BB962C8B-B14F-4D97-AF65-F5344CB8AC3E}">
+        <p14:creationId xmlns:p14="http://schemas.microsoft.com/office/powerpoint/2010/main" val="2822028603"/>
+      </p:ext>
+    </p:extLst>
+  </p:cSld>
+  <p:clrMapOvr>
+    <a:masterClrMapping/>
+  </p:clrMapOvr>
+</p:sldLayout>
+</file>
+
+<file path=ppt/slideLayouts/slideLayout42.xml><?xml version="1.0" encoding="utf-8"?>
+<p:sldLayout xmlns:a="http://schemas.openxmlformats.org/drawingml/2006/main" xmlns:r="http://schemas.openxmlformats.org/officeDocument/2006/relationships" xmlns:p="http://schemas.openxmlformats.org/presentationml/2006/main" type="picTx" preserve="1">
+  <p:cSld name="Picture with Caption">
+    <p:spTree>
+      <p:nvGrpSpPr>
+        <p:cNvPr id="1" name=""/>
+        <p:cNvGrpSpPr/>
+        <p:nvPr/>
+      </p:nvGrpSpPr>
+      <p:grpSpPr>
+        <a:xfrm>
+          <a:off x="0" y="0"/>
+          <a:ext cx="0" cy="0"/>
+          <a:chOff x="0" y="0"/>
+          <a:chExt cx="0" cy="0"/>
+        </a:xfrm>
+      </p:grpSpPr>
+      <p:sp>
+        <p:nvSpPr>
+          <p:cNvPr id="2" name="Title 1">
+            <a:extLst>
+              <a:ext uri="{FF2B5EF4-FFF2-40B4-BE49-F238E27FC236}">
+                <a16:creationId xmlns:a16="http://schemas.microsoft.com/office/drawing/2014/main" id="{0F222231-D1C6-4C52-8322-1BD560B61758}"/>
+              </a:ext>
+            </a:extLst>
+          </p:cNvPr>
+          <p:cNvSpPr>
+            <a:spLocks noGrp="1"/>
+          </p:cNvSpPr>
+          <p:nvPr>
+            <p:ph type="title"/>
+          </p:nvPr>
+        </p:nvSpPr>
+        <p:spPr>
+          <a:xfrm>
+            <a:off x="839788" y="457200"/>
+            <a:ext cx="3932237" cy="1600200"/>
+          </a:xfrm>
+        </p:spPr>
+        <p:txBody>
+          <a:bodyPr anchor="b"/>
+          <a:lstStyle>
+            <a:lvl1pPr>
+              <a:defRPr sz="3200"/>
+            </a:lvl1pPr>
+          </a:lstStyle>
+          <a:p>
+            <a:r>
+              <a:rPr lang="en-US"/>
+              <a:t>Click to edit Master title style</a:t>
+            </a:r>
+          </a:p>
+        </p:txBody>
+      </p:sp>
+      <p:sp>
+        <p:nvSpPr>
+          <p:cNvPr id="3" name="Picture Placeholder 2">
+            <a:extLst>
+              <a:ext uri="{FF2B5EF4-FFF2-40B4-BE49-F238E27FC236}">
+                <a16:creationId xmlns:a16="http://schemas.microsoft.com/office/drawing/2014/main" id="{DFA18741-06CA-49E8-A27D-E6EE22C9FFFA}"/>
+              </a:ext>
+            </a:extLst>
+          </p:cNvPr>
+          <p:cNvSpPr>
+            <a:spLocks noGrp="1"/>
+          </p:cNvSpPr>
+          <p:nvPr>
+            <p:ph type="pic" idx="1"/>
+          </p:nvPr>
+        </p:nvSpPr>
+        <p:spPr>
+          <a:xfrm>
+            <a:off x="5183188" y="987425"/>
+            <a:ext cx="6172200" cy="4873625"/>
+          </a:xfrm>
+        </p:spPr>
+        <p:txBody>
+          <a:bodyPr/>
+          <a:lstStyle>
+            <a:lvl1pPr marL="0" indent="0">
+              <a:buNone/>
+              <a:defRPr sz="3200"/>
+            </a:lvl1pPr>
+            <a:lvl2pPr marL="457200" indent="0">
+              <a:buNone/>
+              <a:defRPr sz="2800"/>
+            </a:lvl2pPr>
+            <a:lvl3pPr marL="914400" indent="0">
+              <a:buNone/>
+              <a:defRPr sz="2400"/>
+            </a:lvl3pPr>
+            <a:lvl4pPr marL="1371600" indent="0">
+              <a:buNone/>
+              <a:defRPr sz="2000"/>
+            </a:lvl4pPr>
+            <a:lvl5pPr marL="1828800" indent="0">
+              <a:buNone/>
+              <a:defRPr sz="2000"/>
+            </a:lvl5pPr>
+            <a:lvl6pPr marL="2286000" indent="0">
+              <a:buNone/>
+              <a:defRPr sz="2000"/>
+            </a:lvl6pPr>
+            <a:lvl7pPr marL="2743200" indent="0">
+              <a:buNone/>
+              <a:defRPr sz="2000"/>
+            </a:lvl7pPr>
+            <a:lvl8pPr marL="3200400" indent="0">
+              <a:buNone/>
+              <a:defRPr sz="2000"/>
+            </a:lvl8pPr>
+            <a:lvl9pPr marL="3657600" indent="0">
+              <a:buNone/>
+              <a:defRPr sz="2000"/>
+            </a:lvl9pPr>
+          </a:lstStyle>
+          <a:p>
+            <a:endParaRPr lang="en-US"/>
+          </a:p>
+        </p:txBody>
+      </p:sp>
+      <p:sp>
+        <p:nvSpPr>
+          <p:cNvPr id="4" name="Text Placeholder 3">
+            <a:extLst>
+              <a:ext uri="{FF2B5EF4-FFF2-40B4-BE49-F238E27FC236}">
+                <a16:creationId xmlns:a16="http://schemas.microsoft.com/office/drawing/2014/main" id="{B0D07719-5176-4C8F-92FA-655AE09C3185}"/>
+              </a:ext>
+            </a:extLst>
+          </p:cNvPr>
+          <p:cNvSpPr>
+            <a:spLocks noGrp="1"/>
+          </p:cNvSpPr>
+          <p:nvPr>
+            <p:ph type="body" sz="half" idx="2"/>
+          </p:nvPr>
+        </p:nvSpPr>
+        <p:spPr>
+          <a:xfrm>
+            <a:off x="839788" y="2057400"/>
+            <a:ext cx="3932237" cy="3811588"/>
+          </a:xfrm>
+        </p:spPr>
+        <p:txBody>
+          <a:bodyPr/>
+          <a:lstStyle>
+            <a:lvl1pPr marL="0" indent="0">
+              <a:buNone/>
+              <a:defRPr sz="1600"/>
+            </a:lvl1pPr>
+            <a:lvl2pPr marL="457200" indent="0">
+              <a:buNone/>
+              <a:defRPr sz="1400"/>
+            </a:lvl2pPr>
+            <a:lvl3pPr marL="914400" indent="0">
+              <a:buNone/>
+              <a:defRPr sz="1200"/>
+            </a:lvl3pPr>
+            <a:lvl4pPr marL="1371600" indent="0">
+              <a:buNone/>
+              <a:defRPr sz="1000"/>
+            </a:lvl4pPr>
+            <a:lvl5pPr marL="1828800" indent="0">
+              <a:buNone/>
+              <a:defRPr sz="1000"/>
+            </a:lvl5pPr>
+            <a:lvl6pPr marL="2286000" indent="0">
+              <a:buNone/>
+              <a:defRPr sz="1000"/>
+            </a:lvl6pPr>
+            <a:lvl7pPr marL="2743200" indent="0">
+              <a:buNone/>
+              <a:defRPr sz="1000"/>
+            </a:lvl7pPr>
+            <a:lvl8pPr marL="3200400" indent="0">
+              <a:buNone/>
+              <a:defRPr sz="1000"/>
+            </a:lvl8pPr>
+            <a:lvl9pPr marL="3657600" indent="0">
+              <a:buNone/>
+              <a:defRPr sz="1000"/>
+            </a:lvl9pPr>
+          </a:lstStyle>
+          <a:p>
+            <a:pPr lvl="0"/>
+            <a:r>
+              <a:rPr lang="en-US"/>
+              <a:t>Edit Master text styles</a:t>
+            </a:r>
+          </a:p>
+        </p:txBody>
+      </p:sp>
+      <p:sp>
+        <p:nvSpPr>
+          <p:cNvPr id="5" name="Date Placeholder 4">
+            <a:extLst>
+              <a:ext uri="{FF2B5EF4-FFF2-40B4-BE49-F238E27FC236}">
+                <a16:creationId xmlns:a16="http://schemas.microsoft.com/office/drawing/2014/main" id="{F20F2EF7-23FF-4CD6-B1A7-174F418766F9}"/>
+              </a:ext>
+            </a:extLst>
+          </p:cNvPr>
+          <p:cNvSpPr>
+            <a:spLocks noGrp="1"/>
+          </p:cNvSpPr>
+          <p:nvPr>
+            <p:ph type="dt" sz="half" idx="10"/>
+          </p:nvPr>
+        </p:nvSpPr>
+        <p:spPr/>
+        <p:txBody>
+          <a:bodyPr/>
+          <a:lstStyle/>
+          <a:p>
+            <a:fld id="{1F0BD816-9A3A-4BB3-9BB4-7DC3AD6D52E8}" type="datetimeFigureOut">
+              <a:rPr lang="en-US" smtClean="0"/>
+              <a:t>6/27/2018</a:t>
+            </a:fld>
+            <a:endParaRPr lang="en-US"/>
+          </a:p>
+        </p:txBody>
+      </p:sp>
+      <p:sp>
+        <p:nvSpPr>
+          <p:cNvPr id="6" name="Footer Placeholder 5">
+            <a:extLst>
+              <a:ext uri="{FF2B5EF4-FFF2-40B4-BE49-F238E27FC236}">
+                <a16:creationId xmlns:a16="http://schemas.microsoft.com/office/drawing/2014/main" id="{6F646FC9-75E1-425C-A8EE-82B2960594B0}"/>
+              </a:ext>
+            </a:extLst>
+          </p:cNvPr>
+          <p:cNvSpPr>
+            <a:spLocks noGrp="1"/>
+          </p:cNvSpPr>
+          <p:nvPr>
+            <p:ph type="ftr" sz="quarter" idx="11"/>
+          </p:nvPr>
+        </p:nvSpPr>
+        <p:spPr/>
+        <p:txBody>
+          <a:bodyPr/>
+          <a:lstStyle/>
+          <a:p>
+            <a:endParaRPr lang="en-US"/>
+          </a:p>
+        </p:txBody>
+      </p:sp>
+      <p:sp>
+        <p:nvSpPr>
+          <p:cNvPr id="7" name="Slide Number Placeholder 6">
+            <a:extLst>
+              <a:ext uri="{FF2B5EF4-FFF2-40B4-BE49-F238E27FC236}">
+                <a16:creationId xmlns:a16="http://schemas.microsoft.com/office/drawing/2014/main" id="{B27CEE21-E157-438E-9378-5877157F20F7}"/>
+              </a:ext>
+            </a:extLst>
+          </p:cNvPr>
+          <p:cNvSpPr>
+            <a:spLocks noGrp="1"/>
+          </p:cNvSpPr>
+          <p:nvPr>
+            <p:ph type="sldNum" sz="quarter" idx="12"/>
+          </p:nvPr>
+        </p:nvSpPr>
+        <p:spPr/>
+        <p:txBody>
+          <a:bodyPr/>
+          <a:lstStyle/>
+          <a:p>
+            <a:fld id="{991A58A3-3A43-45C0-9C4A-B69A740D0EFF}" type="slidenum">
+              <a:rPr lang="en-US" smtClean="0"/>
+              <a:t>‹#›</a:t>
+            </a:fld>
+            <a:endParaRPr lang="en-US"/>
+          </a:p>
+        </p:txBody>
+      </p:sp>
+    </p:spTree>
+    <p:extLst>
+      <p:ext uri="{BB962C8B-B14F-4D97-AF65-F5344CB8AC3E}">
+        <p14:creationId xmlns:p14="http://schemas.microsoft.com/office/powerpoint/2010/main" val="1002963979"/>
+      </p:ext>
+    </p:extLst>
+  </p:cSld>
+  <p:clrMapOvr>
+    <a:masterClrMapping/>
+  </p:clrMapOvr>
+</p:sldLayout>
+</file>
+
+<file path=ppt/slideLayouts/slideLayout43.xml><?xml version="1.0" encoding="utf-8"?>
+<p:sldLayout xmlns:a="http://schemas.openxmlformats.org/drawingml/2006/main" xmlns:r="http://schemas.openxmlformats.org/officeDocument/2006/relationships" xmlns:p="http://schemas.openxmlformats.org/presentationml/2006/main" type="vertTx" preserve="1">
+  <p:cSld name="Title and Vertical Text">
+    <p:spTree>
+      <p:nvGrpSpPr>
+        <p:cNvPr id="1" name=""/>
+        <p:cNvGrpSpPr/>
+        <p:nvPr/>
+      </p:nvGrpSpPr>
+      <p:grpSpPr>
+        <a:xfrm>
+          <a:off x="0" y="0"/>
+          <a:ext cx="0" cy="0"/>
+          <a:chOff x="0" y="0"/>
+          <a:chExt cx="0" cy="0"/>
+        </a:xfrm>
+      </p:grpSpPr>
+      <p:sp>
+        <p:nvSpPr>
+          <p:cNvPr id="2" name="Title 1">
+            <a:extLst>
+              <a:ext uri="{FF2B5EF4-FFF2-40B4-BE49-F238E27FC236}">
+                <a16:creationId xmlns:a16="http://schemas.microsoft.com/office/drawing/2014/main" id="{35FD2189-038D-4340-8AF8-4B19E783BCA6}"/>
+              </a:ext>
+            </a:extLst>
+          </p:cNvPr>
+          <p:cNvSpPr>
+            <a:spLocks noGrp="1"/>
+          </p:cNvSpPr>
+          <p:nvPr>
+            <p:ph type="title"/>
+          </p:nvPr>
+        </p:nvSpPr>
+        <p:spPr/>
+        <p:txBody>
+          <a:bodyPr/>
+          <a:lstStyle/>
+          <a:p>
+            <a:r>
+              <a:rPr lang="en-US"/>
+              <a:t>Click to edit Master title style</a:t>
+            </a:r>
+          </a:p>
+        </p:txBody>
+      </p:sp>
+      <p:sp>
+        <p:nvSpPr>
+          <p:cNvPr id="3" name="Vertical Text Placeholder 2">
+            <a:extLst>
+              <a:ext uri="{FF2B5EF4-FFF2-40B4-BE49-F238E27FC236}">
+                <a16:creationId xmlns:a16="http://schemas.microsoft.com/office/drawing/2014/main" id="{63D74337-E5F7-470E-BD55-168301BDD232}"/>
+              </a:ext>
+            </a:extLst>
+          </p:cNvPr>
+          <p:cNvSpPr>
+            <a:spLocks noGrp="1"/>
+          </p:cNvSpPr>
+          <p:nvPr>
+            <p:ph type="body" orient="vert" idx="1"/>
+          </p:nvPr>
+        </p:nvSpPr>
+        <p:spPr/>
+        <p:txBody>
+          <a:bodyPr vert="eaVert"/>
+          <a:lstStyle/>
+          <a:p>
+            <a:pPr lvl="0"/>
+            <a:r>
+              <a:rPr lang="en-US"/>
+              <a:t>Edit Master text styles</a:t>
+            </a:r>
+          </a:p>
+          <a:p>
+            <a:pPr lvl="1"/>
+            <a:r>
+              <a:rPr lang="en-US"/>
+              <a:t>Second level</a:t>
+            </a:r>
+          </a:p>
+          <a:p>
+            <a:pPr lvl="2"/>
+            <a:r>
+              <a:rPr lang="en-US"/>
+              <a:t>Third level</a:t>
+            </a:r>
+          </a:p>
+          <a:p>
+            <a:pPr lvl="3"/>
+            <a:r>
+              <a:rPr lang="en-US"/>
+              <a:t>Fourth level</a:t>
+            </a:r>
+          </a:p>
+          <a:p>
+            <a:pPr lvl="4"/>
+            <a:r>
+              <a:rPr lang="en-US"/>
+              <a:t>Fifth level</a:t>
+            </a:r>
+          </a:p>
+        </p:txBody>
+      </p:sp>
+      <p:sp>
+        <p:nvSpPr>
+          <p:cNvPr id="4" name="Date Placeholder 3">
+            <a:extLst>
+              <a:ext uri="{FF2B5EF4-FFF2-40B4-BE49-F238E27FC236}">
+                <a16:creationId xmlns:a16="http://schemas.microsoft.com/office/drawing/2014/main" id="{31237CBA-1EC4-4A58-8636-3CC07E20CC7E}"/>
+              </a:ext>
+            </a:extLst>
+          </p:cNvPr>
+          <p:cNvSpPr>
+            <a:spLocks noGrp="1"/>
+          </p:cNvSpPr>
+          <p:nvPr>
+            <p:ph type="dt" sz="half" idx="10"/>
+          </p:nvPr>
+        </p:nvSpPr>
+        <p:spPr/>
+        <p:txBody>
+          <a:bodyPr/>
+          <a:lstStyle/>
+          <a:p>
+            <a:fld id="{1F0BD816-9A3A-4BB3-9BB4-7DC3AD6D52E8}" type="datetimeFigureOut">
+              <a:rPr lang="en-US" smtClean="0"/>
+              <a:t>6/27/2018</a:t>
+            </a:fld>
+            <a:endParaRPr lang="en-US"/>
+          </a:p>
+        </p:txBody>
+      </p:sp>
+      <p:sp>
+        <p:nvSpPr>
+          <p:cNvPr id="5" name="Footer Placeholder 4">
+            <a:extLst>
+              <a:ext uri="{FF2B5EF4-FFF2-40B4-BE49-F238E27FC236}">
+                <a16:creationId xmlns:a16="http://schemas.microsoft.com/office/drawing/2014/main" id="{90CE3302-20DA-4F66-ABBA-474608FCFC99}"/>
+              </a:ext>
+            </a:extLst>
+          </p:cNvPr>
+          <p:cNvSpPr>
+            <a:spLocks noGrp="1"/>
+          </p:cNvSpPr>
+          <p:nvPr>
+            <p:ph type="ftr" sz="quarter" idx="11"/>
+          </p:nvPr>
+        </p:nvSpPr>
+        <p:spPr/>
+        <p:txBody>
+          <a:bodyPr/>
+          <a:lstStyle/>
+          <a:p>
+            <a:endParaRPr lang="en-US"/>
+          </a:p>
+        </p:txBody>
+      </p:sp>
+      <p:sp>
+        <p:nvSpPr>
+          <p:cNvPr id="6" name="Slide Number Placeholder 5">
+            <a:extLst>
+              <a:ext uri="{FF2B5EF4-FFF2-40B4-BE49-F238E27FC236}">
+                <a16:creationId xmlns:a16="http://schemas.microsoft.com/office/drawing/2014/main" id="{6DBC6860-5354-4C13-9DCD-FDE5E1D4DF95}"/>
+              </a:ext>
+            </a:extLst>
+          </p:cNvPr>
+          <p:cNvSpPr>
+            <a:spLocks noGrp="1"/>
+          </p:cNvSpPr>
+          <p:nvPr>
+            <p:ph type="sldNum" sz="quarter" idx="12"/>
+          </p:nvPr>
+        </p:nvSpPr>
+        <p:spPr/>
+        <p:txBody>
+          <a:bodyPr/>
+          <a:lstStyle/>
+          <a:p>
+            <a:fld id="{991A58A3-3A43-45C0-9C4A-B69A740D0EFF}" type="slidenum">
+              <a:rPr lang="en-US" smtClean="0"/>
+              <a:t>‹#›</a:t>
+            </a:fld>
+            <a:endParaRPr lang="en-US"/>
+          </a:p>
+        </p:txBody>
+      </p:sp>
+    </p:spTree>
+    <p:extLst>
+      <p:ext uri="{BB962C8B-B14F-4D97-AF65-F5344CB8AC3E}">
+        <p14:creationId xmlns:p14="http://schemas.microsoft.com/office/powerpoint/2010/main" val="2749897042"/>
+      </p:ext>
+    </p:extLst>
+  </p:cSld>
+  <p:clrMapOvr>
+    <a:masterClrMapping/>
+  </p:clrMapOvr>
+</p:sldLayout>
+</file>
+
+<file path=ppt/slideLayouts/slideLayout44.xml><?xml version="1.0" encoding="utf-8"?>
+<p:sldLayout xmlns:a="http://schemas.openxmlformats.org/drawingml/2006/main" xmlns:r="http://schemas.openxmlformats.org/officeDocument/2006/relationships" xmlns:p="http://schemas.openxmlformats.org/presentationml/2006/main" type="vertTitleAndTx" preserve="1">
+  <p:cSld name="Vertical Title and Text">
+    <p:spTree>
+      <p:nvGrpSpPr>
+        <p:cNvPr id="1" name=""/>
+        <p:cNvGrpSpPr/>
+        <p:nvPr/>
+      </p:nvGrpSpPr>
+      <p:grpSpPr>
+        <a:xfrm>
+          <a:off x="0" y="0"/>
+          <a:ext cx="0" cy="0"/>
+          <a:chOff x="0" y="0"/>
+          <a:chExt cx="0" cy="0"/>
+        </a:xfrm>
+      </p:grpSpPr>
+      <p:sp>
+        <p:nvSpPr>
+          <p:cNvPr id="2" name="Vertical Title 1">
+            <a:extLst>
+              <a:ext uri="{FF2B5EF4-FFF2-40B4-BE49-F238E27FC236}">
+                <a16:creationId xmlns:a16="http://schemas.microsoft.com/office/drawing/2014/main" id="{CB99AF93-B7BC-4E79-93E7-F1CCC70C1F8C}"/>
+              </a:ext>
+            </a:extLst>
+          </p:cNvPr>
+          <p:cNvSpPr>
+            <a:spLocks noGrp="1"/>
+          </p:cNvSpPr>
+          <p:nvPr>
+            <p:ph type="title" orient="vert"/>
+          </p:nvPr>
+        </p:nvSpPr>
+        <p:spPr>
+          <a:xfrm>
+            <a:off x="8724900" y="365125"/>
+            <a:ext cx="2628900" cy="5811838"/>
+          </a:xfrm>
+        </p:spPr>
+        <p:txBody>
+          <a:bodyPr vert="eaVert"/>
+          <a:lstStyle/>
+          <a:p>
+            <a:r>
+              <a:rPr lang="en-US"/>
+              <a:t>Click to edit Master title style</a:t>
+            </a:r>
+          </a:p>
+        </p:txBody>
+      </p:sp>
+      <p:sp>
+        <p:nvSpPr>
+          <p:cNvPr id="3" name="Vertical Text Placeholder 2">
+            <a:extLst>
+              <a:ext uri="{FF2B5EF4-FFF2-40B4-BE49-F238E27FC236}">
+                <a16:creationId xmlns:a16="http://schemas.microsoft.com/office/drawing/2014/main" id="{497F2C21-B15B-493A-B676-D5B9ED03C441}"/>
+              </a:ext>
+            </a:extLst>
+          </p:cNvPr>
+          <p:cNvSpPr>
+            <a:spLocks noGrp="1"/>
+          </p:cNvSpPr>
+          <p:nvPr>
+            <p:ph type="body" orient="vert" idx="1"/>
+          </p:nvPr>
+        </p:nvSpPr>
+        <p:spPr>
+          <a:xfrm>
+            <a:off x="838200" y="365125"/>
+            <a:ext cx="7734300" cy="5811838"/>
+          </a:xfrm>
+        </p:spPr>
+        <p:txBody>
+          <a:bodyPr vert="eaVert"/>
+          <a:lstStyle/>
+          <a:p>
+            <a:pPr lvl="0"/>
+            <a:r>
+              <a:rPr lang="en-US"/>
+              <a:t>Edit Master text styles</a:t>
+            </a:r>
+          </a:p>
+          <a:p>
+            <a:pPr lvl="1"/>
+            <a:r>
+              <a:rPr lang="en-US"/>
+              <a:t>Second level</a:t>
+            </a:r>
+          </a:p>
+          <a:p>
+            <a:pPr lvl="2"/>
+            <a:r>
+              <a:rPr lang="en-US"/>
+              <a:t>Third level</a:t>
+            </a:r>
+          </a:p>
+          <a:p>
+            <a:pPr lvl="3"/>
+            <a:r>
+              <a:rPr lang="en-US"/>
+              <a:t>Fourth level</a:t>
+            </a:r>
+          </a:p>
+          <a:p>
+            <a:pPr lvl="4"/>
+            <a:r>
+              <a:rPr lang="en-US"/>
+              <a:t>Fifth level</a:t>
+            </a:r>
+          </a:p>
+        </p:txBody>
+      </p:sp>
+      <p:sp>
+        <p:nvSpPr>
+          <p:cNvPr id="4" name="Date Placeholder 3">
+            <a:extLst>
+              <a:ext uri="{FF2B5EF4-FFF2-40B4-BE49-F238E27FC236}">
+                <a16:creationId xmlns:a16="http://schemas.microsoft.com/office/drawing/2014/main" id="{FA945048-76B0-466A-8137-7C0AF76FE228}"/>
+              </a:ext>
+            </a:extLst>
+          </p:cNvPr>
+          <p:cNvSpPr>
+            <a:spLocks noGrp="1"/>
+          </p:cNvSpPr>
+          <p:nvPr>
+            <p:ph type="dt" sz="half" idx="10"/>
+          </p:nvPr>
+        </p:nvSpPr>
+        <p:spPr/>
+        <p:txBody>
+          <a:bodyPr/>
+          <a:lstStyle/>
+          <a:p>
+            <a:fld id="{1F0BD816-9A3A-4BB3-9BB4-7DC3AD6D52E8}" type="datetimeFigureOut">
+              <a:rPr lang="en-US" smtClean="0"/>
+              <a:t>6/27/2018</a:t>
+            </a:fld>
+            <a:endParaRPr lang="en-US"/>
+          </a:p>
+        </p:txBody>
+      </p:sp>
+      <p:sp>
+        <p:nvSpPr>
+          <p:cNvPr id="5" name="Footer Placeholder 4">
+            <a:extLst>
+              <a:ext uri="{FF2B5EF4-FFF2-40B4-BE49-F238E27FC236}">
+                <a16:creationId xmlns:a16="http://schemas.microsoft.com/office/drawing/2014/main" id="{38B61727-5CA4-4A26-B462-8E16B95D9C1E}"/>
+              </a:ext>
+            </a:extLst>
+          </p:cNvPr>
+          <p:cNvSpPr>
+            <a:spLocks noGrp="1"/>
+          </p:cNvSpPr>
+          <p:nvPr>
+            <p:ph type="ftr" sz="quarter" idx="11"/>
+          </p:nvPr>
+        </p:nvSpPr>
+        <p:spPr/>
+        <p:txBody>
+          <a:bodyPr/>
+          <a:lstStyle/>
+          <a:p>
+            <a:endParaRPr lang="en-US"/>
+          </a:p>
+        </p:txBody>
+      </p:sp>
+      <p:sp>
+        <p:nvSpPr>
+          <p:cNvPr id="6" name="Slide Number Placeholder 5">
+            <a:extLst>
+              <a:ext uri="{FF2B5EF4-FFF2-40B4-BE49-F238E27FC236}">
+                <a16:creationId xmlns:a16="http://schemas.microsoft.com/office/drawing/2014/main" id="{07A557A8-1A84-4075-A4D1-128F46B6DAB4}"/>
+              </a:ext>
+            </a:extLst>
+          </p:cNvPr>
+          <p:cNvSpPr>
+            <a:spLocks noGrp="1"/>
+          </p:cNvSpPr>
+          <p:nvPr>
+            <p:ph type="sldNum" sz="quarter" idx="12"/>
+          </p:nvPr>
+        </p:nvSpPr>
+        <p:spPr/>
+        <p:txBody>
+          <a:bodyPr/>
+          <a:lstStyle/>
+          <a:p>
+            <a:fld id="{991A58A3-3A43-45C0-9C4A-B69A740D0EFF}" type="slidenum">
+              <a:rPr lang="en-US" smtClean="0"/>
+              <a:t>‹#›</a:t>
+            </a:fld>
+            <a:endParaRPr lang="en-US"/>
+          </a:p>
+        </p:txBody>
+      </p:sp>
+    </p:spTree>
+    <p:extLst>
+      <p:ext uri="{BB962C8B-B14F-4D97-AF65-F5344CB8AC3E}">
+        <p14:creationId xmlns:p14="http://schemas.microsoft.com/office/powerpoint/2010/main" val="2343913274"/>
+      </p:ext>
+    </p:extLst>
   </p:cSld>
   <p:clrMapOvr>
     <a:masterClrMapping/>
@@ -8355,7 +10986,7 @@
           </a:ln>
           <a:extLst>
             <a:ext uri="{C572A759-6A51-4108-AA02-DFA0A04FC94B}">
-              <ma14:wrappingTextBoxFlag xmlns="" xmlns:ma14="http://schemas.microsoft.com/office/mac/drawingml/2011/main" val="1"/>
+              <ma14:wrappingTextBoxFlag xmlns:ma14="http://schemas.microsoft.com/office/mac/drawingml/2011/main" xmlns="" val="1"/>
             </a:ext>
           </a:extLst>
         </p:spPr>
@@ -8394,7 +11025,7 @@
           </a:ln>
           <a:extLst>
             <a:ext uri="{C572A759-6A51-4108-AA02-DFA0A04FC94B}">
-              <ma14:wrappingTextBoxFlag xmlns="" xmlns:ma14="http://schemas.microsoft.com/office/mac/drawingml/2011/main" val="1"/>
+              <ma14:wrappingTextBoxFlag xmlns:ma14="http://schemas.microsoft.com/office/mac/drawingml/2011/main" xmlns="" val="1"/>
             </a:ext>
           </a:extLst>
         </p:spPr>
@@ -9311,6 +11942,574 @@
 </p:sldMaster>
 </file>
 
+<file path=ppt/slideMasters/slideMaster4.xml><?xml version="1.0" encoding="utf-8"?>
+<p:sldMaster xmlns:a="http://schemas.openxmlformats.org/drawingml/2006/main" xmlns:r="http://schemas.openxmlformats.org/officeDocument/2006/relationships" xmlns:p="http://schemas.openxmlformats.org/presentationml/2006/main">
+  <p:cSld>
+    <p:bg>
+      <p:bgRef idx="1001">
+        <a:schemeClr val="bg1"/>
+      </p:bgRef>
+    </p:bg>
+    <p:spTree>
+      <p:nvGrpSpPr>
+        <p:cNvPr id="1" name=""/>
+        <p:cNvGrpSpPr/>
+        <p:nvPr/>
+      </p:nvGrpSpPr>
+      <p:grpSpPr>
+        <a:xfrm>
+          <a:off x="0" y="0"/>
+          <a:ext cx="0" cy="0"/>
+          <a:chOff x="0" y="0"/>
+          <a:chExt cx="0" cy="0"/>
+        </a:xfrm>
+      </p:grpSpPr>
+      <p:sp>
+        <p:nvSpPr>
+          <p:cNvPr id="2" name="Title Placeholder 1">
+            <a:extLst>
+              <a:ext uri="{FF2B5EF4-FFF2-40B4-BE49-F238E27FC236}">
+                <a16:creationId xmlns:a16="http://schemas.microsoft.com/office/drawing/2014/main" id="{86F14F90-11A0-4E69-9E5C-29313CCA24D3}"/>
+              </a:ext>
+            </a:extLst>
+          </p:cNvPr>
+          <p:cNvSpPr>
+            <a:spLocks noGrp="1"/>
+          </p:cNvSpPr>
+          <p:nvPr>
+            <p:ph type="title"/>
+          </p:nvPr>
+        </p:nvSpPr>
+        <p:spPr>
+          <a:xfrm>
+            <a:off x="838200" y="365125"/>
+            <a:ext cx="10515600" cy="1325563"/>
+          </a:xfrm>
+          <a:prstGeom prst="rect">
+            <a:avLst/>
+          </a:prstGeom>
+        </p:spPr>
+        <p:txBody>
+          <a:bodyPr vert="horz" lIns="91440" tIns="45720" rIns="91440" bIns="45720" rtlCol="0" anchor="ctr">
+            <a:normAutofit/>
+          </a:bodyPr>
+          <a:lstStyle/>
+          <a:p>
+            <a:r>
+              <a:rPr lang="en-US"/>
+              <a:t>Click to edit Master title style</a:t>
+            </a:r>
+          </a:p>
+        </p:txBody>
+      </p:sp>
+      <p:sp>
+        <p:nvSpPr>
+          <p:cNvPr id="3" name="Text Placeholder 2">
+            <a:extLst>
+              <a:ext uri="{FF2B5EF4-FFF2-40B4-BE49-F238E27FC236}">
+                <a16:creationId xmlns:a16="http://schemas.microsoft.com/office/drawing/2014/main" id="{69BCFC7B-A05F-498C-8537-B5D6478EE002}"/>
+              </a:ext>
+            </a:extLst>
+          </p:cNvPr>
+          <p:cNvSpPr>
+            <a:spLocks noGrp="1"/>
+          </p:cNvSpPr>
+          <p:nvPr>
+            <p:ph type="body" idx="1"/>
+          </p:nvPr>
+        </p:nvSpPr>
+        <p:spPr>
+          <a:xfrm>
+            <a:off x="838200" y="1825625"/>
+            <a:ext cx="10515600" cy="4351338"/>
+          </a:xfrm>
+          <a:prstGeom prst="rect">
+            <a:avLst/>
+          </a:prstGeom>
+        </p:spPr>
+        <p:txBody>
+          <a:bodyPr vert="horz" lIns="91440" tIns="45720" rIns="91440" bIns="45720" rtlCol="0">
+            <a:normAutofit/>
+          </a:bodyPr>
+          <a:lstStyle/>
+          <a:p>
+            <a:pPr lvl="0"/>
+            <a:r>
+              <a:rPr lang="en-US"/>
+              <a:t>Edit Master text styles</a:t>
+            </a:r>
+          </a:p>
+          <a:p>
+            <a:pPr lvl="1"/>
+            <a:r>
+              <a:rPr lang="en-US"/>
+              <a:t>Second level</a:t>
+            </a:r>
+          </a:p>
+          <a:p>
+            <a:pPr lvl="2"/>
+            <a:r>
+              <a:rPr lang="en-US"/>
+              <a:t>Third level</a:t>
+            </a:r>
+          </a:p>
+          <a:p>
+            <a:pPr lvl="3"/>
+            <a:r>
+              <a:rPr lang="en-US"/>
+              <a:t>Fourth level</a:t>
+            </a:r>
+          </a:p>
+          <a:p>
+            <a:pPr lvl="4"/>
+            <a:r>
+              <a:rPr lang="en-US"/>
+              <a:t>Fifth level</a:t>
+            </a:r>
+          </a:p>
+        </p:txBody>
+      </p:sp>
+      <p:sp>
+        <p:nvSpPr>
+          <p:cNvPr id="4" name="Date Placeholder 3">
+            <a:extLst>
+              <a:ext uri="{FF2B5EF4-FFF2-40B4-BE49-F238E27FC236}">
+                <a16:creationId xmlns:a16="http://schemas.microsoft.com/office/drawing/2014/main" id="{173D281A-5EA3-4B96-AF02-9CDCD1BD86D1}"/>
+              </a:ext>
+            </a:extLst>
+          </p:cNvPr>
+          <p:cNvSpPr>
+            <a:spLocks noGrp="1"/>
+          </p:cNvSpPr>
+          <p:nvPr>
+            <p:ph type="dt" sz="half" idx="2"/>
+          </p:nvPr>
+        </p:nvSpPr>
+        <p:spPr>
+          <a:xfrm>
+            <a:off x="838200" y="6356350"/>
+            <a:ext cx="2743200" cy="365125"/>
+          </a:xfrm>
+          <a:prstGeom prst="rect">
+            <a:avLst/>
+          </a:prstGeom>
+        </p:spPr>
+        <p:txBody>
+          <a:bodyPr vert="horz" lIns="91440" tIns="45720" rIns="91440" bIns="45720" rtlCol="0" anchor="ctr"/>
+          <a:lstStyle>
+            <a:lvl1pPr algn="l">
+              <a:defRPr sz="1200">
+                <a:solidFill>
+                  <a:schemeClr val="tx1">
+                    <a:tint val="75000"/>
+                  </a:schemeClr>
+                </a:solidFill>
+              </a:defRPr>
+            </a:lvl1pPr>
+          </a:lstStyle>
+          <a:p>
+            <a:fld id="{1F0BD816-9A3A-4BB3-9BB4-7DC3AD6D52E8}" type="datetimeFigureOut">
+              <a:rPr lang="en-US" smtClean="0"/>
+              <a:t>6/27/2018</a:t>
+            </a:fld>
+            <a:endParaRPr lang="en-US"/>
+          </a:p>
+        </p:txBody>
+      </p:sp>
+      <p:sp>
+        <p:nvSpPr>
+          <p:cNvPr id="5" name="Footer Placeholder 4">
+            <a:extLst>
+              <a:ext uri="{FF2B5EF4-FFF2-40B4-BE49-F238E27FC236}">
+                <a16:creationId xmlns:a16="http://schemas.microsoft.com/office/drawing/2014/main" id="{9D8F5CAD-7CD6-4283-99FC-B90056590BB4}"/>
+              </a:ext>
+            </a:extLst>
+          </p:cNvPr>
+          <p:cNvSpPr>
+            <a:spLocks noGrp="1"/>
+          </p:cNvSpPr>
+          <p:nvPr>
+            <p:ph type="ftr" sz="quarter" idx="3"/>
+          </p:nvPr>
+        </p:nvSpPr>
+        <p:spPr>
+          <a:xfrm>
+            <a:off x="4038600" y="6356350"/>
+            <a:ext cx="4114800" cy="365125"/>
+          </a:xfrm>
+          <a:prstGeom prst="rect">
+            <a:avLst/>
+          </a:prstGeom>
+        </p:spPr>
+        <p:txBody>
+          <a:bodyPr vert="horz" lIns="91440" tIns="45720" rIns="91440" bIns="45720" rtlCol="0" anchor="ctr"/>
+          <a:lstStyle>
+            <a:lvl1pPr algn="ctr">
+              <a:defRPr sz="1200">
+                <a:solidFill>
+                  <a:schemeClr val="tx1">
+                    <a:tint val="75000"/>
+                  </a:schemeClr>
+                </a:solidFill>
+              </a:defRPr>
+            </a:lvl1pPr>
+          </a:lstStyle>
+          <a:p>
+            <a:endParaRPr lang="en-US"/>
+          </a:p>
+        </p:txBody>
+      </p:sp>
+      <p:sp>
+        <p:nvSpPr>
+          <p:cNvPr id="6" name="Slide Number Placeholder 5">
+            <a:extLst>
+              <a:ext uri="{FF2B5EF4-FFF2-40B4-BE49-F238E27FC236}">
+                <a16:creationId xmlns:a16="http://schemas.microsoft.com/office/drawing/2014/main" id="{39F6B59E-D840-4647-948D-9546F7F1F68F}"/>
+              </a:ext>
+            </a:extLst>
+          </p:cNvPr>
+          <p:cNvSpPr>
+            <a:spLocks noGrp="1"/>
+          </p:cNvSpPr>
+          <p:nvPr>
+            <p:ph type="sldNum" sz="quarter" idx="4"/>
+          </p:nvPr>
+        </p:nvSpPr>
+        <p:spPr>
+          <a:xfrm>
+            <a:off x="8610600" y="6356350"/>
+            <a:ext cx="2743200" cy="365125"/>
+          </a:xfrm>
+          <a:prstGeom prst="rect">
+            <a:avLst/>
+          </a:prstGeom>
+        </p:spPr>
+        <p:txBody>
+          <a:bodyPr vert="horz" lIns="91440" tIns="45720" rIns="91440" bIns="45720" rtlCol="0" anchor="ctr"/>
+          <a:lstStyle>
+            <a:lvl1pPr algn="r">
+              <a:defRPr sz="1200">
+                <a:solidFill>
+                  <a:schemeClr val="tx1">
+                    <a:tint val="75000"/>
+                  </a:schemeClr>
+                </a:solidFill>
+              </a:defRPr>
+            </a:lvl1pPr>
+          </a:lstStyle>
+          <a:p>
+            <a:fld id="{991A58A3-3A43-45C0-9C4A-B69A740D0EFF}" type="slidenum">
+              <a:rPr lang="en-US" smtClean="0"/>
+              <a:t>‹#›</a:t>
+            </a:fld>
+            <a:endParaRPr lang="en-US"/>
+          </a:p>
+        </p:txBody>
+      </p:sp>
+    </p:spTree>
+    <p:extLst>
+      <p:ext uri="{BB962C8B-B14F-4D97-AF65-F5344CB8AC3E}">
+        <p14:creationId xmlns:p14="http://schemas.microsoft.com/office/powerpoint/2010/main" val="1312116147"/>
+      </p:ext>
+    </p:extLst>
+  </p:cSld>
+  <p:clrMap bg1="lt1" tx1="dk1" bg2="lt2" tx2="dk2" accent1="accent1" accent2="accent2" accent3="accent3" accent4="accent4" accent5="accent5" accent6="accent6" hlink="hlink" folHlink="folHlink"/>
+  <p:sldLayoutIdLst>
+    <p:sldLayoutId id="2147483685" r:id="rId1"/>
+    <p:sldLayoutId id="2147483686" r:id="rId2"/>
+    <p:sldLayoutId id="2147483687" r:id="rId3"/>
+    <p:sldLayoutId id="2147483688" r:id="rId4"/>
+    <p:sldLayoutId id="2147483689" r:id="rId5"/>
+    <p:sldLayoutId id="2147483690" r:id="rId6"/>
+    <p:sldLayoutId id="2147483691" r:id="rId7"/>
+    <p:sldLayoutId id="2147483692" r:id="rId8"/>
+    <p:sldLayoutId id="2147483693" r:id="rId9"/>
+    <p:sldLayoutId id="2147483694" r:id="rId10"/>
+    <p:sldLayoutId id="2147483695" r:id="rId11"/>
+  </p:sldLayoutIdLst>
+  <p:txStyles>
+    <p:titleStyle>
+      <a:lvl1pPr algn="l" defTabSz="914400" rtl="0" eaLnBrk="1" latinLnBrk="0" hangingPunct="1">
+        <a:lnSpc>
+          <a:spcPct val="90000"/>
+        </a:lnSpc>
+        <a:spcBef>
+          <a:spcPct val="0"/>
+        </a:spcBef>
+        <a:buNone/>
+        <a:defRPr sz="4400" kern="1200">
+          <a:solidFill>
+            <a:schemeClr val="tx1"/>
+          </a:solidFill>
+          <a:latin typeface="+mj-lt"/>
+          <a:ea typeface="+mj-ea"/>
+          <a:cs typeface="+mj-cs"/>
+        </a:defRPr>
+      </a:lvl1pPr>
+    </p:titleStyle>
+    <p:bodyStyle>
+      <a:lvl1pPr marL="228600" indent="-228600" algn="l" defTabSz="914400" rtl="0" eaLnBrk="1" latinLnBrk="0" hangingPunct="1">
+        <a:lnSpc>
+          <a:spcPct val="90000"/>
+        </a:lnSpc>
+        <a:spcBef>
+          <a:spcPts val="1000"/>
+        </a:spcBef>
+        <a:buFont typeface="Arial" panose="020B0604020202020204" pitchFamily="34" charset="0"/>
+        <a:buChar char="•"/>
+        <a:defRPr sz="2800" kern="1200">
+          <a:solidFill>
+            <a:schemeClr val="tx1"/>
+          </a:solidFill>
+          <a:latin typeface="+mn-lt"/>
+          <a:ea typeface="+mn-ea"/>
+          <a:cs typeface="+mn-cs"/>
+        </a:defRPr>
+      </a:lvl1pPr>
+      <a:lvl2pPr marL="685800" indent="-228600" algn="l" defTabSz="914400" rtl="0" eaLnBrk="1" latinLnBrk="0" hangingPunct="1">
+        <a:lnSpc>
+          <a:spcPct val="90000"/>
+        </a:lnSpc>
+        <a:spcBef>
+          <a:spcPts val="500"/>
+        </a:spcBef>
+        <a:buFont typeface="Arial" panose="020B0604020202020204" pitchFamily="34" charset="0"/>
+        <a:buChar char="•"/>
+        <a:defRPr sz="2400" kern="1200">
+          <a:solidFill>
+            <a:schemeClr val="tx1"/>
+          </a:solidFill>
+          <a:latin typeface="+mn-lt"/>
+          <a:ea typeface="+mn-ea"/>
+          <a:cs typeface="+mn-cs"/>
+        </a:defRPr>
+      </a:lvl2pPr>
+      <a:lvl3pPr marL="1143000" indent="-228600" algn="l" defTabSz="914400" rtl="0" eaLnBrk="1" latinLnBrk="0" hangingPunct="1">
+        <a:lnSpc>
+          <a:spcPct val="90000"/>
+        </a:lnSpc>
+        <a:spcBef>
+          <a:spcPts val="500"/>
+        </a:spcBef>
+        <a:buFont typeface="Arial" panose="020B0604020202020204" pitchFamily="34" charset="0"/>
+        <a:buChar char="•"/>
+        <a:defRPr sz="2000" kern="1200">
+          <a:solidFill>
+            <a:schemeClr val="tx1"/>
+          </a:solidFill>
+          <a:latin typeface="+mn-lt"/>
+          <a:ea typeface="+mn-ea"/>
+          <a:cs typeface="+mn-cs"/>
+        </a:defRPr>
+      </a:lvl3pPr>
+      <a:lvl4pPr marL="1600200" indent="-228600" algn="l" defTabSz="914400" rtl="0" eaLnBrk="1" latinLnBrk="0" hangingPunct="1">
+        <a:lnSpc>
+          <a:spcPct val="90000"/>
+        </a:lnSpc>
+        <a:spcBef>
+          <a:spcPts val="500"/>
+        </a:spcBef>
+        <a:buFont typeface="Arial" panose="020B0604020202020204" pitchFamily="34" charset="0"/>
+        <a:buChar char="•"/>
+        <a:defRPr sz="1800" kern="1200">
+          <a:solidFill>
+            <a:schemeClr val="tx1"/>
+          </a:solidFill>
+          <a:latin typeface="+mn-lt"/>
+          <a:ea typeface="+mn-ea"/>
+          <a:cs typeface="+mn-cs"/>
+        </a:defRPr>
+      </a:lvl4pPr>
+      <a:lvl5pPr marL="2057400" indent="-228600" algn="l" defTabSz="914400" rtl="0" eaLnBrk="1" latinLnBrk="0" hangingPunct="1">
+        <a:lnSpc>
+          <a:spcPct val="90000"/>
+        </a:lnSpc>
+        <a:spcBef>
+          <a:spcPts val="500"/>
+        </a:spcBef>
+        <a:buFont typeface="Arial" panose="020B0604020202020204" pitchFamily="34" charset="0"/>
+        <a:buChar char="•"/>
+        <a:defRPr sz="1800" kern="1200">
+          <a:solidFill>
+            <a:schemeClr val="tx1"/>
+          </a:solidFill>
+          <a:latin typeface="+mn-lt"/>
+          <a:ea typeface="+mn-ea"/>
+          <a:cs typeface="+mn-cs"/>
+        </a:defRPr>
+      </a:lvl5pPr>
+      <a:lvl6pPr marL="2514600" indent="-228600" algn="l" defTabSz="914400" rtl="0" eaLnBrk="1" latinLnBrk="0" hangingPunct="1">
+        <a:lnSpc>
+          <a:spcPct val="90000"/>
+        </a:lnSpc>
+        <a:spcBef>
+          <a:spcPts val="500"/>
+        </a:spcBef>
+        <a:buFont typeface="Arial" panose="020B0604020202020204" pitchFamily="34" charset="0"/>
+        <a:buChar char="•"/>
+        <a:defRPr sz="1800" kern="1200">
+          <a:solidFill>
+            <a:schemeClr val="tx1"/>
+          </a:solidFill>
+          <a:latin typeface="+mn-lt"/>
+          <a:ea typeface="+mn-ea"/>
+          <a:cs typeface="+mn-cs"/>
+        </a:defRPr>
+      </a:lvl6pPr>
+      <a:lvl7pPr marL="2971800" indent="-228600" algn="l" defTabSz="914400" rtl="0" eaLnBrk="1" latinLnBrk="0" hangingPunct="1">
+        <a:lnSpc>
+          <a:spcPct val="90000"/>
+        </a:lnSpc>
+        <a:spcBef>
+          <a:spcPts val="500"/>
+        </a:spcBef>
+        <a:buFont typeface="Arial" panose="020B0604020202020204" pitchFamily="34" charset="0"/>
+        <a:buChar char="•"/>
+        <a:defRPr sz="1800" kern="1200">
+          <a:solidFill>
+            <a:schemeClr val="tx1"/>
+          </a:solidFill>
+          <a:latin typeface="+mn-lt"/>
+          <a:ea typeface="+mn-ea"/>
+          <a:cs typeface="+mn-cs"/>
+        </a:defRPr>
+      </a:lvl7pPr>
+      <a:lvl8pPr marL="3429000" indent="-228600" algn="l" defTabSz="914400" rtl="0" eaLnBrk="1" latinLnBrk="0" hangingPunct="1">
+        <a:lnSpc>
+          <a:spcPct val="90000"/>
+        </a:lnSpc>
+        <a:spcBef>
+          <a:spcPts val="500"/>
+        </a:spcBef>
+        <a:buFont typeface="Arial" panose="020B0604020202020204" pitchFamily="34" charset="0"/>
+        <a:buChar char="•"/>
+        <a:defRPr sz="1800" kern="1200">
+          <a:solidFill>
+            <a:schemeClr val="tx1"/>
+          </a:solidFill>
+          <a:latin typeface="+mn-lt"/>
+          <a:ea typeface="+mn-ea"/>
+          <a:cs typeface="+mn-cs"/>
+        </a:defRPr>
+      </a:lvl8pPr>
+      <a:lvl9pPr marL="3886200" indent="-228600" algn="l" defTabSz="914400" rtl="0" eaLnBrk="1" latinLnBrk="0" hangingPunct="1">
+        <a:lnSpc>
+          <a:spcPct val="90000"/>
+        </a:lnSpc>
+        <a:spcBef>
+          <a:spcPts val="500"/>
+        </a:spcBef>
+        <a:buFont typeface="Arial" panose="020B0604020202020204" pitchFamily="34" charset="0"/>
+        <a:buChar char="•"/>
+        <a:defRPr sz="1800" kern="1200">
+          <a:solidFill>
+            <a:schemeClr val="tx1"/>
+          </a:solidFill>
+          <a:latin typeface="+mn-lt"/>
+          <a:ea typeface="+mn-ea"/>
+          <a:cs typeface="+mn-cs"/>
+        </a:defRPr>
+      </a:lvl9pPr>
+    </p:bodyStyle>
+    <p:otherStyle>
+      <a:defPPr>
+        <a:defRPr lang="en-US"/>
+      </a:defPPr>
+      <a:lvl1pPr marL="0" algn="l" defTabSz="914400" rtl="0" eaLnBrk="1" latinLnBrk="0" hangingPunct="1">
+        <a:defRPr sz="1800" kern="1200">
+          <a:solidFill>
+            <a:schemeClr val="tx1"/>
+          </a:solidFill>
+          <a:latin typeface="+mn-lt"/>
+          <a:ea typeface="+mn-ea"/>
+          <a:cs typeface="+mn-cs"/>
+        </a:defRPr>
+      </a:lvl1pPr>
+      <a:lvl2pPr marL="457200" algn="l" defTabSz="914400" rtl="0" eaLnBrk="1" latinLnBrk="0" hangingPunct="1">
+        <a:defRPr sz="1800" kern="1200">
+          <a:solidFill>
+            <a:schemeClr val="tx1"/>
+          </a:solidFill>
+          <a:latin typeface="+mn-lt"/>
+          <a:ea typeface="+mn-ea"/>
+          <a:cs typeface="+mn-cs"/>
+        </a:defRPr>
+      </a:lvl2pPr>
+      <a:lvl3pPr marL="914400" algn="l" defTabSz="914400" rtl="0" eaLnBrk="1" latinLnBrk="0" hangingPunct="1">
+        <a:defRPr sz="1800" kern="1200">
+          <a:solidFill>
+            <a:schemeClr val="tx1"/>
+          </a:solidFill>
+          <a:latin typeface="+mn-lt"/>
+          <a:ea typeface="+mn-ea"/>
+          <a:cs typeface="+mn-cs"/>
+        </a:defRPr>
+      </a:lvl3pPr>
+      <a:lvl4pPr marL="1371600" algn="l" defTabSz="914400" rtl="0" eaLnBrk="1" latinLnBrk="0" hangingPunct="1">
+        <a:defRPr sz="1800" kern="1200">
+          <a:solidFill>
+            <a:schemeClr val="tx1"/>
+          </a:solidFill>
+          <a:latin typeface="+mn-lt"/>
+          <a:ea typeface="+mn-ea"/>
+          <a:cs typeface="+mn-cs"/>
+        </a:defRPr>
+      </a:lvl4pPr>
+      <a:lvl5pPr marL="1828800" algn="l" defTabSz="914400" rtl="0" eaLnBrk="1" latinLnBrk="0" hangingPunct="1">
+        <a:defRPr sz="1800" kern="1200">
+          <a:solidFill>
+            <a:schemeClr val="tx1"/>
+          </a:solidFill>
+          <a:latin typeface="+mn-lt"/>
+          <a:ea typeface="+mn-ea"/>
+          <a:cs typeface="+mn-cs"/>
+        </a:defRPr>
+      </a:lvl5pPr>
+      <a:lvl6pPr marL="2286000" algn="l" defTabSz="914400" rtl="0" eaLnBrk="1" latinLnBrk="0" hangingPunct="1">
+        <a:defRPr sz="1800" kern="1200">
+          <a:solidFill>
+            <a:schemeClr val="tx1"/>
+          </a:solidFill>
+          <a:latin typeface="+mn-lt"/>
+          <a:ea typeface="+mn-ea"/>
+          <a:cs typeface="+mn-cs"/>
+        </a:defRPr>
+      </a:lvl6pPr>
+      <a:lvl7pPr marL="2743200" algn="l" defTabSz="914400" rtl="0" eaLnBrk="1" latinLnBrk="0" hangingPunct="1">
+        <a:defRPr sz="1800" kern="1200">
+          <a:solidFill>
+            <a:schemeClr val="tx1"/>
+          </a:solidFill>
+          <a:latin typeface="+mn-lt"/>
+          <a:ea typeface="+mn-ea"/>
+          <a:cs typeface="+mn-cs"/>
+        </a:defRPr>
+      </a:lvl7pPr>
+      <a:lvl8pPr marL="3200400" algn="l" defTabSz="914400" rtl="0" eaLnBrk="1" latinLnBrk="0" hangingPunct="1">
+        <a:defRPr sz="1800" kern="1200">
+          <a:solidFill>
+            <a:schemeClr val="tx1"/>
+          </a:solidFill>
+          <a:latin typeface="+mn-lt"/>
+          <a:ea typeface="+mn-ea"/>
+          <a:cs typeface="+mn-cs"/>
+        </a:defRPr>
+      </a:lvl8pPr>
+      <a:lvl9pPr marL="3657600" algn="l" defTabSz="914400" rtl="0" eaLnBrk="1" latinLnBrk="0" hangingPunct="1">
+        <a:defRPr sz="1800" kern="1200">
+          <a:solidFill>
+            <a:schemeClr val="tx1"/>
+          </a:solidFill>
+          <a:latin typeface="+mn-lt"/>
+          <a:ea typeface="+mn-ea"/>
+          <a:cs typeface="+mn-cs"/>
+        </a:defRPr>
+      </a:lvl9pPr>
+    </p:otherStyle>
+  </p:txStyles>
+</p:sldMaster>
+</file>
+
 <file path=ppt/slides/slide1.xml><?xml version="1.0" encoding="utf-8"?>
 <p:sld xmlns:a="http://schemas.openxmlformats.org/drawingml/2006/main" xmlns:r="http://schemas.openxmlformats.org/officeDocument/2006/relationships" xmlns:p="http://schemas.openxmlformats.org/presentationml/2006/main">
   <p:cSld>
@@ -12564,6 +15763,658 @@
     <p:bg>
       <p:bgPr>
         <a:solidFill>
+          <a:srgbClr val="4D545C"/>
+        </a:solidFill>
+        <a:effectLst/>
+      </p:bgPr>
+    </p:bg>
+    <p:spTree>
+      <p:nvGrpSpPr>
+        <p:cNvPr id="1" name=""/>
+        <p:cNvGrpSpPr/>
+        <p:nvPr/>
+      </p:nvGrpSpPr>
+      <p:grpSpPr>
+        <a:xfrm>
+          <a:off x="0" y="0"/>
+          <a:ext cx="0" cy="0"/>
+          <a:chOff x="0" y="0"/>
+          <a:chExt cx="0" cy="0"/>
+        </a:xfrm>
+      </p:grpSpPr>
+      <p:sp>
+        <p:nvSpPr>
+          <p:cNvPr id="5" name="TextBox 4">
+            <a:extLst>
+              <a:ext uri="{FF2B5EF4-FFF2-40B4-BE49-F238E27FC236}">
+                <a16:creationId xmlns:a16="http://schemas.microsoft.com/office/drawing/2014/main" id="{FD1FAA90-3C0E-49EA-A2CD-8528F9347858}"/>
+              </a:ext>
+            </a:extLst>
+          </p:cNvPr>
+          <p:cNvSpPr txBox="1"/>
+          <p:nvPr/>
+        </p:nvSpPr>
+        <p:spPr>
+          <a:xfrm>
+            <a:off x="2092569" y="123092"/>
+            <a:ext cx="7508631" cy="830997"/>
+          </a:xfrm>
+          <a:prstGeom prst="rect">
+            <a:avLst/>
+          </a:prstGeom>
+          <a:noFill/>
+        </p:spPr>
+        <p:txBody>
+          <a:bodyPr wrap="square" rtlCol="0">
+            <a:spAutoFit/>
+          </a:bodyPr>
+          <a:lstStyle/>
+          <a:p>
+            <a:pPr marL="0" marR="0" lvl="0" indent="0" algn="ctr" defTabSz="914400" rtl="0" eaLnBrk="1" fontAlgn="auto" latinLnBrk="0" hangingPunct="1">
+              <a:lnSpc>
+                <a:spcPct val="100000"/>
+              </a:lnSpc>
+              <a:spcBef>
+                <a:spcPts val="0"/>
+              </a:spcBef>
+              <a:spcAft>
+                <a:spcPts val="0"/>
+              </a:spcAft>
+              <a:buClrTx/>
+              <a:buSzTx/>
+              <a:buFontTx/>
+              <a:buNone/>
+              <a:tabLst/>
+              <a:defRPr/>
+            </a:pPr>
+            <a:r>
+              <a:rPr kumimoji="0" lang="en-GB" sz="4800" b="0" i="0" u="none" strike="noStrike" kern="1200" cap="none" spc="0" normalizeH="0" baseline="0" noProof="0" dirty="0">
+                <a:ln>
+                  <a:noFill/>
+                </a:ln>
+                <a:solidFill>
+                  <a:prstClr val="white"/>
+                </a:solidFill>
+                <a:effectLst/>
+                <a:uLnTx/>
+                <a:uFillTx/>
+                <a:latin typeface="Franklin Gothic Book" panose="020B0503020102020204" pitchFamily="34" charset="0"/>
+                <a:ea typeface="+mn-ea"/>
+                <a:cs typeface="+mn-cs"/>
+              </a:rPr>
+              <a:t>Glasgow Azure User Group</a:t>
+            </a:r>
+            <a:endParaRPr kumimoji="0" lang="en-US" sz="4800" b="0" i="0" u="none" strike="noStrike" kern="1200" cap="none" spc="0" normalizeH="0" baseline="0" noProof="0" dirty="0">
+              <a:ln>
+                <a:noFill/>
+              </a:ln>
+              <a:solidFill>
+                <a:prstClr val="white"/>
+              </a:solidFill>
+              <a:effectLst/>
+              <a:uLnTx/>
+              <a:uFillTx/>
+              <a:latin typeface="Franklin Gothic Book" panose="020B0503020102020204" pitchFamily="34" charset="0"/>
+              <a:ea typeface="+mn-ea"/>
+              <a:cs typeface="+mn-cs"/>
+            </a:endParaRPr>
+          </a:p>
+        </p:txBody>
+      </p:sp>
+      <p:sp>
+        <p:nvSpPr>
+          <p:cNvPr id="6" name="TextBox 5">
+            <a:extLst>
+              <a:ext uri="{FF2B5EF4-FFF2-40B4-BE49-F238E27FC236}">
+                <a16:creationId xmlns:a16="http://schemas.microsoft.com/office/drawing/2014/main" id="{52E5AB60-61E6-4591-8319-E97A65E8A2E4}"/>
+              </a:ext>
+            </a:extLst>
+          </p:cNvPr>
+          <p:cNvSpPr txBox="1"/>
+          <p:nvPr/>
+        </p:nvSpPr>
+        <p:spPr>
+          <a:xfrm>
+            <a:off x="294967" y="5069479"/>
+            <a:ext cx="5758962" cy="1323439"/>
+          </a:xfrm>
+          <a:prstGeom prst="rect">
+            <a:avLst/>
+          </a:prstGeom>
+          <a:noFill/>
+        </p:spPr>
+        <p:txBody>
+          <a:bodyPr wrap="square" rtlCol="0">
+            <a:spAutoFit/>
+          </a:bodyPr>
+          <a:lstStyle/>
+          <a:p>
+            <a:pPr marL="0" marR="0" lvl="0" indent="0" algn="l" defTabSz="914400" rtl="0" eaLnBrk="1" fontAlgn="auto" latinLnBrk="0" hangingPunct="1">
+              <a:lnSpc>
+                <a:spcPct val="100000"/>
+              </a:lnSpc>
+              <a:spcBef>
+                <a:spcPts val="0"/>
+              </a:spcBef>
+              <a:spcAft>
+                <a:spcPts val="0"/>
+              </a:spcAft>
+              <a:buClrTx/>
+              <a:buSzTx/>
+              <a:buFontTx/>
+              <a:buNone/>
+              <a:tabLst/>
+              <a:defRPr/>
+            </a:pPr>
+            <a:r>
+              <a:rPr kumimoji="0" lang="en-GB" sz="4000" b="0" i="0" u="none" strike="noStrike" kern="1200" cap="none" spc="0" normalizeH="0" baseline="0" noProof="0" dirty="0">
+                <a:ln>
+                  <a:noFill/>
+                </a:ln>
+                <a:solidFill>
+                  <a:srgbClr val="ECA588"/>
+                </a:solidFill>
+                <a:effectLst/>
+                <a:uLnTx/>
+                <a:uFillTx/>
+                <a:latin typeface="Font Awesome 5 Brands Regular" panose="02000503000000000000" pitchFamily="50" charset="0"/>
+                <a:ea typeface="+mn-ea"/>
+                <a:cs typeface="+mn-cs"/>
+              </a:rPr>
+              <a:t> </a:t>
+            </a:r>
+            <a:r>
+              <a:rPr kumimoji="0" lang="en-GB" sz="4000" b="0" i="0" u="none" strike="noStrike" kern="1200" cap="none" spc="0" normalizeH="0" baseline="0" noProof="0" dirty="0">
+                <a:ln>
+                  <a:noFill/>
+                </a:ln>
+                <a:solidFill>
+                  <a:srgbClr val="ECA588"/>
+                </a:solidFill>
+                <a:effectLst/>
+                <a:uLnTx/>
+                <a:uFillTx/>
+                <a:latin typeface="Calibri" panose="020F0502020204030204"/>
+                <a:ea typeface="+mn-ea"/>
+                <a:cs typeface="+mn-cs"/>
+              </a:rPr>
+              <a:t>www.gaug.co.uk</a:t>
+            </a:r>
+            <a:r>
+              <a:rPr kumimoji="0" lang="en-GB" sz="4000" b="0" i="0" u="none" strike="noStrike" kern="1200" cap="none" spc="0" normalizeH="0" baseline="0" noProof="0" dirty="0">
+                <a:ln>
+                  <a:noFill/>
+                </a:ln>
+                <a:solidFill>
+                  <a:srgbClr val="1DCAFF"/>
+                </a:solidFill>
+                <a:effectLst/>
+                <a:uLnTx/>
+                <a:uFillTx/>
+                <a:latin typeface="Font Awesome 5 Brands Regular" panose="02000503000000000000" pitchFamily="50" charset="0"/>
+                <a:ea typeface="+mn-ea"/>
+                <a:cs typeface="+mn-cs"/>
+              </a:rPr>
+              <a:t> </a:t>
+            </a:r>
+            <a:r>
+              <a:rPr kumimoji="0" lang="en-GB" sz="4000" b="0" i="0" u="none" strike="noStrike" kern="1200" cap="none" spc="0" normalizeH="0" baseline="0" noProof="0" dirty="0">
+                <a:ln>
+                  <a:noFill/>
+                </a:ln>
+                <a:solidFill>
+                  <a:srgbClr val="1DCAFF"/>
+                </a:solidFill>
+                <a:effectLst/>
+                <a:uLnTx/>
+                <a:uFillTx/>
+                <a:latin typeface="Calibri" panose="020F0502020204030204"/>
+                <a:ea typeface="+mn-ea"/>
+                <a:cs typeface="+mn-cs"/>
+              </a:rPr>
+              <a:t>@</a:t>
+            </a:r>
+            <a:r>
+              <a:rPr kumimoji="0" lang="en-GB" sz="4000" b="0" i="0" u="none" strike="noStrike" kern="1200" cap="none" spc="0" normalizeH="0" baseline="0" noProof="0" dirty="0" err="1">
+                <a:ln>
+                  <a:noFill/>
+                </a:ln>
+                <a:solidFill>
+                  <a:srgbClr val="1DCAFF"/>
+                </a:solidFill>
+                <a:effectLst/>
+                <a:uLnTx/>
+                <a:uFillTx/>
+                <a:latin typeface="Calibri" panose="020F0502020204030204"/>
+                <a:ea typeface="+mn-ea"/>
+                <a:cs typeface="+mn-cs"/>
+              </a:rPr>
+              <a:t>GlasgowAzureUG</a:t>
+            </a:r>
+            <a:endParaRPr kumimoji="0" lang="en-US" sz="4000" b="0" i="0" u="none" strike="noStrike" kern="1200" cap="none" spc="0" normalizeH="0" baseline="0" noProof="0" dirty="0">
+              <a:ln>
+                <a:noFill/>
+              </a:ln>
+              <a:solidFill>
+                <a:srgbClr val="1DCAFF"/>
+              </a:solidFill>
+              <a:effectLst/>
+              <a:uLnTx/>
+              <a:uFillTx/>
+              <a:latin typeface="Calibri" panose="020F0502020204030204"/>
+              <a:ea typeface="+mn-ea"/>
+              <a:cs typeface="+mn-cs"/>
+            </a:endParaRPr>
+          </a:p>
+        </p:txBody>
+      </p:sp>
+      <p:pic>
+        <p:nvPicPr>
+          <p:cNvPr id="8" name="Picture 7" descr="Glasgow skyline">
+            <a:extLst>
+              <a:ext uri="{FF2B5EF4-FFF2-40B4-BE49-F238E27FC236}">
+                <a16:creationId xmlns:a16="http://schemas.microsoft.com/office/drawing/2014/main" id="{265ABC50-D277-4B79-9748-831D5870907F}"/>
+              </a:ext>
+              <a:ext uri="{C183D7F6-B498-43B3-948B-1728B52AA6E4}">
+                <adec:decorative xmlns:adec="http://schemas.microsoft.com/office/drawing/2017/decorative" val="0"/>
+              </a:ext>
+            </a:extLst>
+          </p:cNvPr>
+          <p:cNvPicPr>
+            <a:picLocks noChangeAspect="1"/>
+          </p:cNvPicPr>
+          <p:nvPr/>
+        </p:nvPicPr>
+        <p:blipFill>
+          <a:blip r:embed="rId2">
+            <a:extLst>
+              <a:ext uri="{28A0092B-C50C-407E-A947-70E740481C1C}">
+                <a14:useLocalDpi xmlns:a14="http://schemas.microsoft.com/office/drawing/2010/main" val="0"/>
+              </a:ext>
+            </a:extLst>
+          </a:blip>
+          <a:stretch>
+            <a:fillRect/>
+          </a:stretch>
+        </p:blipFill>
+        <p:spPr>
+          <a:xfrm>
+            <a:off x="760777" y="538590"/>
+            <a:ext cx="11016147" cy="1785821"/>
+          </a:xfrm>
+          <a:prstGeom prst="rect">
+            <a:avLst/>
+          </a:prstGeom>
+        </p:spPr>
+      </p:pic>
+      <p:pic>
+        <p:nvPicPr>
+          <p:cNvPr id="4" name="Picture 3">
+            <a:extLst>
+              <a:ext uri="{FF2B5EF4-FFF2-40B4-BE49-F238E27FC236}">
+                <a16:creationId xmlns:a16="http://schemas.microsoft.com/office/drawing/2014/main" id="{6096524A-D0A9-4FE3-A397-C8709DA910D9}"/>
+              </a:ext>
+            </a:extLst>
+          </p:cNvPr>
+          <p:cNvPicPr>
+            <a:picLocks noChangeAspect="1"/>
+          </p:cNvPicPr>
+          <p:nvPr/>
+        </p:nvPicPr>
+        <p:blipFill>
+          <a:blip r:embed="rId3">
+            <a:extLst>
+              <a:ext uri="{28A0092B-C50C-407E-A947-70E740481C1C}">
+                <a14:useLocalDpi xmlns:a14="http://schemas.microsoft.com/office/drawing/2010/main" val="0"/>
+              </a:ext>
+            </a:extLst>
+          </a:blip>
+          <a:stretch>
+            <a:fillRect/>
+          </a:stretch>
+        </p:blipFill>
+        <p:spPr>
+          <a:xfrm>
+            <a:off x="9161583" y="3143575"/>
+            <a:ext cx="3405953" cy="1788125"/>
+          </a:xfrm>
+          <a:prstGeom prst="rect">
+            <a:avLst/>
+          </a:prstGeom>
+        </p:spPr>
+      </p:pic>
+      <p:sp>
+        <p:nvSpPr>
+          <p:cNvPr id="7" name="Heart 6">
+            <a:extLst>
+              <a:ext uri="{FF2B5EF4-FFF2-40B4-BE49-F238E27FC236}">
+                <a16:creationId xmlns:a16="http://schemas.microsoft.com/office/drawing/2014/main" id="{8164DB85-03D8-472D-82A9-364219E8C5A4}"/>
+              </a:ext>
+            </a:extLst>
+          </p:cNvPr>
+          <p:cNvSpPr/>
+          <p:nvPr/>
+        </p:nvSpPr>
+        <p:spPr>
+          <a:xfrm rot="1119513">
+            <a:off x="11374163" y="3073122"/>
+            <a:ext cx="536331" cy="440749"/>
+          </a:xfrm>
+          <a:prstGeom prst="heart">
+            <a:avLst/>
+          </a:prstGeom>
+          <a:solidFill>
+            <a:srgbClr val="FF0000"/>
+          </a:solidFill>
+        </p:spPr>
+        <p:style>
+          <a:lnRef idx="2">
+            <a:schemeClr val="accent1">
+              <a:shade val="50000"/>
+            </a:schemeClr>
+          </a:lnRef>
+          <a:fillRef idx="1">
+            <a:schemeClr val="accent1"/>
+          </a:fillRef>
+          <a:effectRef idx="0">
+            <a:schemeClr val="accent1"/>
+          </a:effectRef>
+          <a:fontRef idx="minor">
+            <a:schemeClr val="lt1"/>
+          </a:fontRef>
+        </p:style>
+        <p:txBody>
+          <a:bodyPr rtlCol="0" anchor="ctr"/>
+          <a:lstStyle/>
+          <a:p>
+            <a:pPr marL="0" marR="0" lvl="0" indent="0" algn="ctr" defTabSz="914400" rtl="0" eaLnBrk="1" fontAlgn="auto" latinLnBrk="0" hangingPunct="1">
+              <a:lnSpc>
+                <a:spcPct val="100000"/>
+              </a:lnSpc>
+              <a:spcBef>
+                <a:spcPts val="0"/>
+              </a:spcBef>
+              <a:spcAft>
+                <a:spcPts val="0"/>
+              </a:spcAft>
+              <a:buClrTx/>
+              <a:buSzTx/>
+              <a:buFontTx/>
+              <a:buNone/>
+              <a:tabLst/>
+              <a:defRPr/>
+            </a:pPr>
+            <a:endParaRPr kumimoji="0" lang="en-US" sz="1800" b="0" i="0" u="none" strike="noStrike" kern="1200" cap="none" spc="0" normalizeH="0" baseline="0" noProof="0">
+              <a:ln>
+                <a:noFill/>
+              </a:ln>
+              <a:solidFill>
+                <a:prstClr val="white"/>
+              </a:solidFill>
+              <a:effectLst/>
+              <a:uLnTx/>
+              <a:uFillTx/>
+              <a:latin typeface="Calibri" panose="020F0502020204030204"/>
+              <a:ea typeface="+mn-ea"/>
+              <a:cs typeface="+mn-cs"/>
+            </a:endParaRPr>
+          </a:p>
+        </p:txBody>
+      </p:sp>
+      <p:sp>
+        <p:nvSpPr>
+          <p:cNvPr id="9" name="Heart 8">
+            <a:extLst>
+              <a:ext uri="{FF2B5EF4-FFF2-40B4-BE49-F238E27FC236}">
+                <a16:creationId xmlns:a16="http://schemas.microsoft.com/office/drawing/2014/main" id="{B70C2959-64B1-4C67-BCED-832F3665B192}"/>
+              </a:ext>
+            </a:extLst>
+          </p:cNvPr>
+          <p:cNvSpPr/>
+          <p:nvPr/>
+        </p:nvSpPr>
+        <p:spPr>
+          <a:xfrm rot="751826">
+            <a:off x="10086244" y="2603186"/>
+            <a:ext cx="536331" cy="440749"/>
+          </a:xfrm>
+          <a:prstGeom prst="heart">
+            <a:avLst/>
+          </a:prstGeom>
+          <a:solidFill>
+            <a:srgbClr val="FF0000"/>
+          </a:solidFill>
+        </p:spPr>
+        <p:style>
+          <a:lnRef idx="2">
+            <a:schemeClr val="accent1">
+              <a:shade val="50000"/>
+            </a:schemeClr>
+          </a:lnRef>
+          <a:fillRef idx="1">
+            <a:schemeClr val="accent1"/>
+          </a:fillRef>
+          <a:effectRef idx="0">
+            <a:schemeClr val="accent1"/>
+          </a:effectRef>
+          <a:fontRef idx="minor">
+            <a:schemeClr val="lt1"/>
+          </a:fontRef>
+        </p:style>
+        <p:txBody>
+          <a:bodyPr rtlCol="0" anchor="ctr"/>
+          <a:lstStyle/>
+          <a:p>
+            <a:pPr marL="0" marR="0" lvl="0" indent="0" algn="ctr" defTabSz="914400" rtl="0" eaLnBrk="1" fontAlgn="auto" latinLnBrk="0" hangingPunct="1">
+              <a:lnSpc>
+                <a:spcPct val="100000"/>
+              </a:lnSpc>
+              <a:spcBef>
+                <a:spcPts val="0"/>
+              </a:spcBef>
+              <a:spcAft>
+                <a:spcPts val="0"/>
+              </a:spcAft>
+              <a:buClrTx/>
+              <a:buSzTx/>
+              <a:buFontTx/>
+              <a:buNone/>
+              <a:tabLst/>
+              <a:defRPr/>
+            </a:pPr>
+            <a:endParaRPr kumimoji="0" lang="en-US" sz="1800" b="0" i="0" u="none" strike="noStrike" kern="1200" cap="none" spc="0" normalizeH="0" baseline="0" noProof="0">
+              <a:ln>
+                <a:noFill/>
+              </a:ln>
+              <a:solidFill>
+                <a:prstClr val="white"/>
+              </a:solidFill>
+              <a:effectLst/>
+              <a:uLnTx/>
+              <a:uFillTx/>
+              <a:latin typeface="Calibri" panose="020F0502020204030204"/>
+              <a:ea typeface="+mn-ea"/>
+              <a:cs typeface="+mn-cs"/>
+            </a:endParaRPr>
+          </a:p>
+        </p:txBody>
+      </p:sp>
+      <p:sp>
+        <p:nvSpPr>
+          <p:cNvPr id="10" name="Heart 9">
+            <a:extLst>
+              <a:ext uri="{FF2B5EF4-FFF2-40B4-BE49-F238E27FC236}">
+                <a16:creationId xmlns:a16="http://schemas.microsoft.com/office/drawing/2014/main" id="{5EBE121B-9A42-429B-B611-D727CA73972A}"/>
+              </a:ext>
+            </a:extLst>
+          </p:cNvPr>
+          <p:cNvSpPr/>
+          <p:nvPr/>
+        </p:nvSpPr>
+        <p:spPr>
+          <a:xfrm rot="883059">
+            <a:off x="10884999" y="2497263"/>
+            <a:ext cx="536331" cy="440749"/>
+          </a:xfrm>
+          <a:prstGeom prst="heart">
+            <a:avLst/>
+          </a:prstGeom>
+          <a:solidFill>
+            <a:srgbClr val="FF0000"/>
+          </a:solidFill>
+        </p:spPr>
+        <p:style>
+          <a:lnRef idx="2">
+            <a:schemeClr val="accent1">
+              <a:shade val="50000"/>
+            </a:schemeClr>
+          </a:lnRef>
+          <a:fillRef idx="1">
+            <a:schemeClr val="accent1"/>
+          </a:fillRef>
+          <a:effectRef idx="0">
+            <a:schemeClr val="accent1"/>
+          </a:effectRef>
+          <a:fontRef idx="minor">
+            <a:schemeClr val="lt1"/>
+          </a:fontRef>
+        </p:style>
+        <p:txBody>
+          <a:bodyPr rtlCol="0" anchor="ctr"/>
+          <a:lstStyle/>
+          <a:p>
+            <a:pPr marL="0" marR="0" lvl="0" indent="0" algn="ctr" defTabSz="914400" rtl="0" eaLnBrk="1" fontAlgn="auto" latinLnBrk="0" hangingPunct="1">
+              <a:lnSpc>
+                <a:spcPct val="100000"/>
+              </a:lnSpc>
+              <a:spcBef>
+                <a:spcPts val="0"/>
+              </a:spcBef>
+              <a:spcAft>
+                <a:spcPts val="0"/>
+              </a:spcAft>
+              <a:buClrTx/>
+              <a:buSzTx/>
+              <a:buFontTx/>
+              <a:buNone/>
+              <a:tabLst/>
+              <a:defRPr/>
+            </a:pPr>
+            <a:endParaRPr kumimoji="0" lang="en-US" sz="1800" b="0" i="0" u="none" strike="noStrike" kern="1200" cap="none" spc="0" normalizeH="0" baseline="0" noProof="0">
+              <a:ln>
+                <a:noFill/>
+              </a:ln>
+              <a:solidFill>
+                <a:prstClr val="white"/>
+              </a:solidFill>
+              <a:effectLst/>
+              <a:uLnTx/>
+              <a:uFillTx/>
+              <a:latin typeface="Calibri" panose="020F0502020204030204"/>
+              <a:ea typeface="+mn-ea"/>
+              <a:cs typeface="+mn-cs"/>
+            </a:endParaRPr>
+          </a:p>
+        </p:txBody>
+      </p:sp>
+      <p:sp>
+        <p:nvSpPr>
+          <p:cNvPr id="11" name="TextBox 10">
+            <a:extLst>
+              <a:ext uri="{FF2B5EF4-FFF2-40B4-BE49-F238E27FC236}">
+                <a16:creationId xmlns:a16="http://schemas.microsoft.com/office/drawing/2014/main" id="{3E8EA23F-3C00-4AD5-B873-DDC144ABAA04}"/>
+              </a:ext>
+            </a:extLst>
+          </p:cNvPr>
+          <p:cNvSpPr txBox="1"/>
+          <p:nvPr/>
+        </p:nvSpPr>
+        <p:spPr>
+          <a:xfrm>
+            <a:off x="518746" y="2717637"/>
+            <a:ext cx="8537331" cy="2062103"/>
+          </a:xfrm>
+          <a:prstGeom prst="rect">
+            <a:avLst/>
+          </a:prstGeom>
+          <a:noFill/>
+        </p:spPr>
+        <p:txBody>
+          <a:bodyPr wrap="square" rtlCol="0">
+            <a:spAutoFit/>
+          </a:bodyPr>
+          <a:lstStyle/>
+          <a:p>
+            <a:pPr marL="0" marR="0" lvl="0" indent="0" algn="ctr" defTabSz="914400" rtl="0" eaLnBrk="1" fontAlgn="auto" latinLnBrk="0" hangingPunct="1">
+              <a:lnSpc>
+                <a:spcPct val="100000"/>
+              </a:lnSpc>
+              <a:spcBef>
+                <a:spcPts val="0"/>
+              </a:spcBef>
+              <a:spcAft>
+                <a:spcPts val="0"/>
+              </a:spcAft>
+              <a:buClrTx/>
+              <a:buSzTx/>
+              <a:buFontTx/>
+              <a:buNone/>
+              <a:tabLst/>
+              <a:defRPr/>
+            </a:pPr>
+            <a:r>
+              <a:rPr kumimoji="0" lang="en-GB" sz="3200" b="0" i="0" u="none" strike="noStrike" kern="1200" cap="none" spc="0" normalizeH="0" baseline="0" noProof="0" dirty="0">
+                <a:ln>
+                  <a:noFill/>
+                </a:ln>
+                <a:solidFill>
+                  <a:prstClr val="white"/>
+                </a:solidFill>
+                <a:effectLst/>
+                <a:uLnTx/>
+                <a:uFillTx/>
+                <a:latin typeface="Calibri" panose="020F0502020204030204"/>
+                <a:ea typeface="+mn-ea"/>
+                <a:cs typeface="+mn-cs"/>
+              </a:rPr>
+              <a:t>Founded in early 2017 as an independent body GAUG aims to bring the together the IT community to collaborate, network and learn from each other. </a:t>
+            </a:r>
+            <a:endParaRPr kumimoji="0" lang="en-US" sz="3200" b="0" i="0" u="none" strike="noStrike" kern="1200" cap="none" spc="0" normalizeH="0" baseline="0" noProof="0" dirty="0">
+              <a:ln>
+                <a:noFill/>
+              </a:ln>
+              <a:solidFill>
+                <a:prstClr val="white"/>
+              </a:solidFill>
+              <a:effectLst/>
+              <a:uLnTx/>
+              <a:uFillTx/>
+              <a:latin typeface="Calibri" panose="020F0502020204030204"/>
+              <a:ea typeface="+mn-ea"/>
+              <a:cs typeface="+mn-cs"/>
+            </a:endParaRPr>
+          </a:p>
+        </p:txBody>
+      </p:sp>
+    </p:spTree>
+    <p:extLst>
+      <p:ext uri="{BB962C8B-B14F-4D97-AF65-F5344CB8AC3E}">
+        <p14:creationId xmlns:p14="http://schemas.microsoft.com/office/powerpoint/2010/main" val="4279086723"/>
+      </p:ext>
+    </p:extLst>
+  </p:cSld>
+  <p:clrMapOvr>
+    <a:masterClrMapping/>
+  </p:clrMapOvr>
+</p:sld>
+</file>
+
+<file path=ppt/slides/slide7.xml><?xml version="1.0" encoding="utf-8"?>
+<p:sld xmlns:a="http://schemas.openxmlformats.org/drawingml/2006/main" xmlns:r="http://schemas.openxmlformats.org/officeDocument/2006/relationships" xmlns:p="http://schemas.openxmlformats.org/presentationml/2006/main">
+  <p:cSld>
+    <p:bg>
+      <p:bgPr>
+        <a:solidFill>
           <a:srgbClr val="0072C6"/>
         </a:solidFill>
         <a:effectLst/>
@@ -13122,7 +16973,7 @@
 </p:sld>
 </file>
 
-<file path=ppt/slides/slide7.xml><?xml version="1.0" encoding="utf-8"?>
+<file path=ppt/slides/slide8.xml><?xml version="1.0" encoding="utf-8"?>
 <p:sld xmlns:a="http://schemas.openxmlformats.org/drawingml/2006/main" xmlns:r="http://schemas.openxmlformats.org/officeDocument/2006/relationships" xmlns:p="http://schemas.openxmlformats.org/presentationml/2006/main">
   <p:cSld>
     <p:bg>
@@ -14973,4 +18824,299 @@
   </a:objectDefaults>
   <a:extraClrSchemeLst/>
 </a:theme>
+</file>
+
+<file path=ppt/theme/theme4.xml><?xml version="1.0" encoding="utf-8"?>
+<a:theme xmlns:a="http://schemas.openxmlformats.org/drawingml/2006/main" name="1_Office Theme">
+  <a:themeElements>
+    <a:clrScheme name="Office">
+      <a:dk1>
+        <a:sysClr val="windowText" lastClr="000000"/>
+      </a:dk1>
+      <a:lt1>
+        <a:sysClr val="window" lastClr="FFFFFF"/>
+      </a:lt1>
+      <a:dk2>
+        <a:srgbClr val="44546A"/>
+      </a:dk2>
+      <a:lt2>
+        <a:srgbClr val="E7E6E6"/>
+      </a:lt2>
+      <a:accent1>
+        <a:srgbClr val="4472C4"/>
+      </a:accent1>
+      <a:accent2>
+        <a:srgbClr val="ED7D31"/>
+      </a:accent2>
+      <a:accent3>
+        <a:srgbClr val="A5A5A5"/>
+      </a:accent3>
+      <a:accent4>
+        <a:srgbClr val="FFC000"/>
+      </a:accent4>
+      <a:accent5>
+        <a:srgbClr val="5B9BD5"/>
+      </a:accent5>
+      <a:accent6>
+        <a:srgbClr val="70AD47"/>
+      </a:accent6>
+      <a:hlink>
+        <a:srgbClr val="0563C1"/>
+      </a:hlink>
+      <a:folHlink>
+        <a:srgbClr val="954F72"/>
+      </a:folHlink>
+    </a:clrScheme>
+    <a:fontScheme name="Office">
+      <a:majorFont>
+        <a:latin typeface="Calibri Light" panose="020F0302020204030204"/>
+        <a:ea typeface=""/>
+        <a:cs typeface=""/>
+        <a:font script="Jpan" typeface="游ゴシック Light"/>
+        <a:font script="Hang" typeface="맑은 고딕"/>
+        <a:font script="Hans" typeface="等线 Light"/>
+        <a:font script="Hant" typeface="新細明體"/>
+        <a:font script="Arab" typeface="Times New Roman"/>
+        <a:font script="Hebr" typeface="Times New Roman"/>
+        <a:font script="Thai" typeface="Angsana New"/>
+        <a:font script="Ethi" typeface="Nyala"/>
+        <a:font script="Beng" typeface="Vrinda"/>
+        <a:font script="Gujr" typeface="Shruti"/>
+        <a:font script="Khmr" typeface="MoolBoran"/>
+        <a:font script="Knda" typeface="Tunga"/>
+        <a:font script="Guru" typeface="Raavi"/>
+        <a:font script="Cans" typeface="Euphemia"/>
+        <a:font script="Cher" typeface="Plantagenet Cherokee"/>
+        <a:font script="Yiii" typeface="Microsoft Yi Baiti"/>
+        <a:font script="Tibt" typeface="Microsoft Himalaya"/>
+        <a:font script="Thaa" typeface="MV Boli"/>
+        <a:font script="Deva" typeface="Mangal"/>
+        <a:font script="Telu" typeface="Gautami"/>
+        <a:font script="Taml" typeface="Latha"/>
+        <a:font script="Syrc" typeface="Estrangelo Edessa"/>
+        <a:font script="Orya" typeface="Kalinga"/>
+        <a:font script="Mlym" typeface="Kartika"/>
+        <a:font script="Laoo" typeface="DokChampa"/>
+        <a:font script="Sinh" typeface="Iskoola Pota"/>
+        <a:font script="Mong" typeface="Mongolian Baiti"/>
+        <a:font script="Viet" typeface="Times New Roman"/>
+        <a:font script="Uigh" typeface="Microsoft Uighur"/>
+        <a:font script="Geor" typeface="Sylfaen"/>
+        <a:font script="Armn" typeface="Arial"/>
+        <a:font script="Bugi" typeface="Leelawadee UI"/>
+        <a:font script="Bopo" typeface="Microsoft JhengHei"/>
+        <a:font script="Java" typeface="Javanese Text"/>
+        <a:font script="Lisu" typeface="Segoe UI"/>
+        <a:font script="Mymr" typeface="Myanmar Text"/>
+        <a:font script="Nkoo" typeface="Ebrima"/>
+        <a:font script="Olck" typeface="Nirmala UI"/>
+        <a:font script="Osma" typeface="Ebrima"/>
+        <a:font script="Phag" typeface="Phagspa"/>
+        <a:font script="Syrn" typeface="Estrangelo Edessa"/>
+        <a:font script="Syrj" typeface="Estrangelo Edessa"/>
+        <a:font script="Syre" typeface="Estrangelo Edessa"/>
+        <a:font script="Sora" typeface="Nirmala UI"/>
+        <a:font script="Tale" typeface="Microsoft Tai Le"/>
+        <a:font script="Talu" typeface="Microsoft New Tai Lue"/>
+        <a:font script="Tfng" typeface="Ebrima"/>
+      </a:majorFont>
+      <a:minorFont>
+        <a:latin typeface="Calibri" panose="020F0502020204030204"/>
+        <a:ea typeface=""/>
+        <a:cs typeface=""/>
+        <a:font script="Jpan" typeface="游ゴシック"/>
+        <a:font script="Hang" typeface="맑은 고딕"/>
+        <a:font script="Hans" typeface="等线"/>
+        <a:font script="Hant" typeface="新細明體"/>
+        <a:font script="Arab" typeface="Arial"/>
+        <a:font script="Hebr" typeface="Arial"/>
+        <a:font script="Thai" typeface="Cordia New"/>
+        <a:font script="Ethi" typeface="Nyala"/>
+        <a:font script="Beng" typeface="Vrinda"/>
+        <a:font script="Gujr" typeface="Shruti"/>
+        <a:font script="Khmr" typeface="DaunPenh"/>
+        <a:font script="Knda" typeface="Tunga"/>
+        <a:font script="Guru" typeface="Raavi"/>
+        <a:font script="Cans" typeface="Euphemia"/>
+        <a:font script="Cher" typeface="Plantagenet Cherokee"/>
+        <a:font script="Yiii" typeface="Microsoft Yi Baiti"/>
+        <a:font script="Tibt" typeface="Microsoft Himalaya"/>
+        <a:font script="Thaa" typeface="MV Boli"/>
+        <a:font script="Deva" typeface="Mangal"/>
+        <a:font script="Telu" typeface="Gautami"/>
+        <a:font script="Taml" typeface="Latha"/>
+        <a:font script="Syrc" typeface="Estrangelo Edessa"/>
+        <a:font script="Orya" typeface="Kalinga"/>
+        <a:font script="Mlym" typeface="Kartika"/>
+        <a:font script="Laoo" typeface="DokChampa"/>
+        <a:font script="Sinh" typeface="Iskoola Pota"/>
+        <a:font script="Mong" typeface="Mongolian Baiti"/>
+        <a:font script="Viet" typeface="Arial"/>
+        <a:font script="Uigh" typeface="Microsoft Uighur"/>
+        <a:font script="Geor" typeface="Sylfaen"/>
+        <a:font script="Armn" typeface="Arial"/>
+        <a:font script="Bugi" typeface="Leelawadee UI"/>
+        <a:font script="Bopo" typeface="Microsoft JhengHei"/>
+        <a:font script="Java" typeface="Javanese Text"/>
+        <a:font script="Lisu" typeface="Segoe UI"/>
+        <a:font script="Mymr" typeface="Myanmar Text"/>
+        <a:font script="Nkoo" typeface="Ebrima"/>
+        <a:font script="Olck" typeface="Nirmala UI"/>
+        <a:font script="Osma" typeface="Ebrima"/>
+        <a:font script="Phag" typeface="Phagspa"/>
+        <a:font script="Syrn" typeface="Estrangelo Edessa"/>
+        <a:font script="Syrj" typeface="Estrangelo Edessa"/>
+        <a:font script="Syre" typeface="Estrangelo Edessa"/>
+        <a:font script="Sora" typeface="Nirmala UI"/>
+        <a:font script="Tale" typeface="Microsoft Tai Le"/>
+        <a:font script="Talu" typeface="Microsoft New Tai Lue"/>
+        <a:font script="Tfng" typeface="Ebrima"/>
+      </a:minorFont>
+    </a:fontScheme>
+    <a:fmtScheme name="Office">
+      <a:fillStyleLst>
+        <a:solidFill>
+          <a:schemeClr val="phClr"/>
+        </a:solidFill>
+        <a:gradFill rotWithShape="1">
+          <a:gsLst>
+            <a:gs pos="0">
+              <a:schemeClr val="phClr">
+                <a:lumMod val="110000"/>
+                <a:satMod val="105000"/>
+                <a:tint val="67000"/>
+              </a:schemeClr>
+            </a:gs>
+            <a:gs pos="50000">
+              <a:schemeClr val="phClr">
+                <a:lumMod val="105000"/>
+                <a:satMod val="103000"/>
+                <a:tint val="73000"/>
+              </a:schemeClr>
+            </a:gs>
+            <a:gs pos="100000">
+              <a:schemeClr val="phClr">
+                <a:lumMod val="105000"/>
+                <a:satMod val="109000"/>
+                <a:tint val="81000"/>
+              </a:schemeClr>
+            </a:gs>
+          </a:gsLst>
+          <a:lin ang="5400000" scaled="0"/>
+        </a:gradFill>
+        <a:gradFill rotWithShape="1">
+          <a:gsLst>
+            <a:gs pos="0">
+              <a:schemeClr val="phClr">
+                <a:satMod val="103000"/>
+                <a:lumMod val="102000"/>
+                <a:tint val="94000"/>
+              </a:schemeClr>
+            </a:gs>
+            <a:gs pos="50000">
+              <a:schemeClr val="phClr">
+                <a:satMod val="110000"/>
+                <a:lumMod val="100000"/>
+                <a:shade val="100000"/>
+              </a:schemeClr>
+            </a:gs>
+            <a:gs pos="100000">
+              <a:schemeClr val="phClr">
+                <a:lumMod val="99000"/>
+                <a:satMod val="120000"/>
+                <a:shade val="78000"/>
+              </a:schemeClr>
+            </a:gs>
+          </a:gsLst>
+          <a:lin ang="5400000" scaled="0"/>
+        </a:gradFill>
+      </a:fillStyleLst>
+      <a:lnStyleLst>
+        <a:ln w="6350" cap="flat" cmpd="sng" algn="ctr">
+          <a:solidFill>
+            <a:schemeClr val="phClr"/>
+          </a:solidFill>
+          <a:prstDash val="solid"/>
+          <a:miter lim="800000"/>
+        </a:ln>
+        <a:ln w="12700" cap="flat" cmpd="sng" algn="ctr">
+          <a:solidFill>
+            <a:schemeClr val="phClr"/>
+          </a:solidFill>
+          <a:prstDash val="solid"/>
+          <a:miter lim="800000"/>
+        </a:ln>
+        <a:ln w="19050" cap="flat" cmpd="sng" algn="ctr">
+          <a:solidFill>
+            <a:schemeClr val="phClr"/>
+          </a:solidFill>
+          <a:prstDash val="solid"/>
+          <a:miter lim="800000"/>
+        </a:ln>
+      </a:lnStyleLst>
+      <a:effectStyleLst>
+        <a:effectStyle>
+          <a:effectLst/>
+        </a:effectStyle>
+        <a:effectStyle>
+          <a:effectLst/>
+        </a:effectStyle>
+        <a:effectStyle>
+          <a:effectLst>
+            <a:outerShdw blurRad="57150" dist="19050" dir="5400000" algn="ctr" rotWithShape="0">
+              <a:srgbClr val="000000">
+                <a:alpha val="63000"/>
+              </a:srgbClr>
+            </a:outerShdw>
+          </a:effectLst>
+        </a:effectStyle>
+      </a:effectStyleLst>
+      <a:bgFillStyleLst>
+        <a:solidFill>
+          <a:schemeClr val="phClr"/>
+        </a:solidFill>
+        <a:solidFill>
+          <a:schemeClr val="phClr">
+            <a:tint val="95000"/>
+            <a:satMod val="170000"/>
+          </a:schemeClr>
+        </a:solidFill>
+        <a:gradFill rotWithShape="1">
+          <a:gsLst>
+            <a:gs pos="0">
+              <a:schemeClr val="phClr">
+                <a:tint val="93000"/>
+                <a:satMod val="150000"/>
+                <a:shade val="98000"/>
+                <a:lumMod val="102000"/>
+              </a:schemeClr>
+            </a:gs>
+            <a:gs pos="50000">
+              <a:schemeClr val="phClr">
+                <a:tint val="98000"/>
+                <a:satMod val="130000"/>
+                <a:shade val="90000"/>
+                <a:lumMod val="103000"/>
+              </a:schemeClr>
+            </a:gs>
+            <a:gs pos="100000">
+              <a:schemeClr val="phClr">
+                <a:shade val="63000"/>
+                <a:satMod val="120000"/>
+              </a:schemeClr>
+            </a:gs>
+          </a:gsLst>
+          <a:lin ang="5400000" scaled="0"/>
+        </a:gradFill>
+      </a:bgFillStyleLst>
+    </a:fmtScheme>
+  </a:themeElements>
+  <a:objectDefaults/>
+  <a:extraClrSchemeLst/>
+  <a:extLst>
+    <a:ext uri="{05A4C25C-085E-4340-85A3-A5531E510DB2}">
+      <thm15:themeFamily xmlns:thm15="http://schemas.microsoft.com/office/thememl/2012/main" name="Office Theme" id="{62F939B6-93AF-4DB8-9C6B-D6C7DFDC589F}" vid="{4A3C46E8-61CC-4603-A589-7422A47A8E4A}"/>
+    </a:ext>
+  </a:extLst>
+</a:theme>
 </file>
</xml_diff>

<commit_message>
updated month on venue slide
</commit_message>
<xml_diff>
--- a/2018/06-June/MeetingAgenda.pptx
+++ b/2018/06-June/MeetingAgenda.pptx
@@ -298,7 +298,7 @@
           <a:p>
             <a:fld id="{96DFF08F-DC6B-4601-B491-B0F83F6DD2DA}" type="datetimeFigureOut">
               <a:rPr lang="en-US" dirty="0"/>
-              <a:t>6/27/2018</a:t>
+              <a:t>6/29/2018</a:t>
             </a:fld>
             <a:endParaRPr lang="en-US" dirty="0"/>
           </a:p>
@@ -463,7 +463,7 @@
           <a:p>
             <a:fld id="{96DFF08F-DC6B-4601-B491-B0F83F6DD2DA}" type="datetimeFigureOut">
               <a:rPr lang="en-US" dirty="0"/>
-              <a:t>6/27/2018</a:t>
+              <a:t>6/29/2018</a:t>
             </a:fld>
             <a:endParaRPr lang="en-US" dirty="0"/>
           </a:p>
@@ -681,7 +681,7 @@
           <a:p>
             <a:fld id="{96DFF08F-DC6B-4601-B491-B0F83F6DD2DA}" type="datetimeFigureOut">
               <a:rPr lang="en-US" dirty="0"/>
-              <a:t>6/27/2018</a:t>
+              <a:t>6/29/2018</a:t>
             </a:fld>
             <a:endParaRPr lang="en-US" dirty="0"/>
           </a:p>
@@ -896,7 +896,7 @@
           <a:p>
             <a:fld id="{D0634792-6DD7-4E5B-BE1E-FD54681891FB}" type="datetimeFigureOut">
               <a:rPr lang="en-GB" smtClean="0"/>
-              <a:t>27/06/2018</a:t>
+              <a:t>29/06/2018</a:t>
             </a:fld>
             <a:endParaRPr lang="en-GB"/>
           </a:p>
@@ -1096,7 +1096,7 @@
           <a:p>
             <a:fld id="{D0634792-6DD7-4E5B-BE1E-FD54681891FB}" type="datetimeFigureOut">
               <a:rPr lang="en-GB" smtClean="0"/>
-              <a:t>27/06/2018</a:t>
+              <a:t>29/06/2018</a:t>
             </a:fld>
             <a:endParaRPr lang="en-GB"/>
           </a:p>
@@ -1372,7 +1372,7 @@
           <a:p>
             <a:fld id="{D0634792-6DD7-4E5B-BE1E-FD54681891FB}" type="datetimeFigureOut">
               <a:rPr lang="en-GB" smtClean="0"/>
-              <a:t>27/06/2018</a:t>
+              <a:t>29/06/2018</a:t>
             </a:fld>
             <a:endParaRPr lang="en-GB"/>
           </a:p>
@@ -1640,7 +1640,7 @@
           <a:p>
             <a:fld id="{D0634792-6DD7-4E5B-BE1E-FD54681891FB}" type="datetimeFigureOut">
               <a:rPr lang="en-GB" smtClean="0"/>
-              <a:t>27/06/2018</a:t>
+              <a:t>29/06/2018</a:t>
             </a:fld>
             <a:endParaRPr lang="en-GB"/>
           </a:p>
@@ -2055,7 +2055,7 @@
           <a:p>
             <a:fld id="{D0634792-6DD7-4E5B-BE1E-FD54681891FB}" type="datetimeFigureOut">
               <a:rPr lang="en-GB" smtClean="0"/>
-              <a:t>27/06/2018</a:t>
+              <a:t>29/06/2018</a:t>
             </a:fld>
             <a:endParaRPr lang="en-GB"/>
           </a:p>
@@ -2197,7 +2197,7 @@
           <a:p>
             <a:fld id="{D0634792-6DD7-4E5B-BE1E-FD54681891FB}" type="datetimeFigureOut">
               <a:rPr lang="en-GB" smtClean="0"/>
-              <a:t>27/06/2018</a:t>
+              <a:t>29/06/2018</a:t>
             </a:fld>
             <a:endParaRPr lang="en-GB"/>
           </a:p>
@@ -2310,7 +2310,7 @@
           <a:p>
             <a:fld id="{D0634792-6DD7-4E5B-BE1E-FD54681891FB}" type="datetimeFigureOut">
               <a:rPr lang="en-GB" smtClean="0"/>
-              <a:t>27/06/2018</a:t>
+              <a:t>29/06/2018</a:t>
             </a:fld>
             <a:endParaRPr lang="en-GB"/>
           </a:p>
@@ -2623,7 +2623,7 @@
           <a:p>
             <a:fld id="{D0634792-6DD7-4E5B-BE1E-FD54681891FB}" type="datetimeFigureOut">
               <a:rPr lang="en-GB" smtClean="0"/>
-              <a:t>27/06/2018</a:t>
+              <a:t>29/06/2018</a:t>
             </a:fld>
             <a:endParaRPr lang="en-GB"/>
           </a:p>
@@ -2805,7 +2805,7 @@
           <a:p>
             <a:fld id="{96DFF08F-DC6B-4601-B491-B0F83F6DD2DA}" type="datetimeFigureOut">
               <a:rPr lang="en-US" dirty="0"/>
-              <a:t>6/27/2018</a:t>
+              <a:t>6/29/2018</a:t>
             </a:fld>
             <a:endParaRPr lang="en-US" dirty="0"/>
           </a:p>
@@ -3077,7 +3077,7 @@
           <a:p>
             <a:fld id="{D0634792-6DD7-4E5B-BE1E-FD54681891FB}" type="datetimeFigureOut">
               <a:rPr lang="en-GB" smtClean="0"/>
-              <a:t>27/06/2018</a:t>
+              <a:t>29/06/2018</a:t>
             </a:fld>
             <a:endParaRPr lang="en-GB"/>
           </a:p>
@@ -3277,7 +3277,7 @@
           <a:p>
             <a:fld id="{D0634792-6DD7-4E5B-BE1E-FD54681891FB}" type="datetimeFigureOut">
               <a:rPr lang="en-GB" smtClean="0"/>
-              <a:t>27/06/2018</a:t>
+              <a:t>29/06/2018</a:t>
             </a:fld>
             <a:endParaRPr lang="en-GB"/>
           </a:p>
@@ -3487,7 +3487,7 @@
           <a:p>
             <a:fld id="{D0634792-6DD7-4E5B-BE1E-FD54681891FB}" type="datetimeFigureOut">
               <a:rPr lang="en-GB" smtClean="0"/>
-              <a:t>27/06/2018</a:t>
+              <a:t>29/06/2018</a:t>
             </a:fld>
             <a:endParaRPr lang="en-GB"/>
           </a:p>
@@ -4869,7 +4869,7 @@
             <a:fld id="{96DFF08F-DC6B-4601-B491-B0F83F6DD2DA}" type="datetimeFigureOut">
               <a:rPr lang="en-US" dirty="0"/>
               <a:pPr/>
-              <a:t>6/27/2018</a:t>
+              <a:t>6/29/2018</a:t>
             </a:fld>
             <a:endParaRPr lang="en-US" dirty="0"/>
           </a:p>
@@ -5796,7 +5796,7 @@
           <a:p>
             <a:fld id="{1F0BD816-9A3A-4BB3-9BB4-7DC3AD6D52E8}" type="datetimeFigureOut">
               <a:rPr lang="en-US" smtClean="0"/>
-              <a:t>6/27/2018</a:t>
+              <a:t>6/29/2018</a:t>
             </a:fld>
             <a:endParaRPr lang="en-US"/>
           </a:p>
@@ -5994,7 +5994,7 @@
           <a:p>
             <a:fld id="{1F0BD816-9A3A-4BB3-9BB4-7DC3AD6D52E8}" type="datetimeFigureOut">
               <a:rPr lang="en-US" smtClean="0"/>
-              <a:t>6/27/2018</a:t>
+              <a:t>6/29/2018</a:t>
             </a:fld>
             <a:endParaRPr lang="en-US"/>
           </a:p>
@@ -6269,7 +6269,7 @@
           <a:p>
             <a:fld id="{1F0BD816-9A3A-4BB3-9BB4-7DC3AD6D52E8}" type="datetimeFigureOut">
               <a:rPr lang="en-US" smtClean="0"/>
-              <a:t>6/27/2018</a:t>
+              <a:t>6/29/2018</a:t>
             </a:fld>
             <a:endParaRPr lang="en-US"/>
           </a:p>
@@ -6534,7 +6534,7 @@
           <a:p>
             <a:fld id="{1F0BD816-9A3A-4BB3-9BB4-7DC3AD6D52E8}" type="datetimeFigureOut">
               <a:rPr lang="en-US" smtClean="0"/>
-              <a:t>6/27/2018</a:t>
+              <a:t>6/29/2018</a:t>
             </a:fld>
             <a:endParaRPr lang="en-US"/>
           </a:p>
@@ -6946,7 +6946,7 @@
           <a:p>
             <a:fld id="{1F0BD816-9A3A-4BB3-9BB4-7DC3AD6D52E8}" type="datetimeFigureOut">
               <a:rPr lang="en-US" smtClean="0"/>
-              <a:t>6/27/2018</a:t>
+              <a:t>6/29/2018</a:t>
             </a:fld>
             <a:endParaRPr lang="en-US"/>
           </a:p>
@@ -7087,7 +7087,7 @@
           <a:p>
             <a:fld id="{1F0BD816-9A3A-4BB3-9BB4-7DC3AD6D52E8}" type="datetimeFigureOut">
               <a:rPr lang="en-US" smtClean="0"/>
-              <a:t>6/27/2018</a:t>
+              <a:t>6/29/2018</a:t>
             </a:fld>
             <a:endParaRPr lang="en-US"/>
           </a:p>
@@ -7387,7 +7387,7 @@
           <a:p>
             <a:fld id="{96DFF08F-DC6B-4601-B491-B0F83F6DD2DA}" type="datetimeFigureOut">
               <a:rPr lang="en-US" dirty="0"/>
-              <a:t>6/27/2018</a:t>
+              <a:t>6/29/2018</a:t>
             </a:fld>
             <a:endParaRPr lang="en-US" dirty="0"/>
           </a:p>
@@ -7483,7 +7483,7 @@
           <a:p>
             <a:fld id="{1F0BD816-9A3A-4BB3-9BB4-7DC3AD6D52E8}" type="datetimeFigureOut">
               <a:rPr lang="en-US" smtClean="0"/>
-              <a:t>6/27/2018</a:t>
+              <a:t>6/29/2018</a:t>
             </a:fld>
             <a:endParaRPr lang="en-US"/>
           </a:p>
@@ -7794,7 +7794,7 @@
           <a:p>
             <a:fld id="{1F0BD816-9A3A-4BB3-9BB4-7DC3AD6D52E8}" type="datetimeFigureOut">
               <a:rPr lang="en-US" smtClean="0"/>
-              <a:t>6/27/2018</a:t>
+              <a:t>6/29/2018</a:t>
             </a:fld>
             <a:endParaRPr lang="en-US"/>
           </a:p>
@@ -8082,7 +8082,7 @@
           <a:p>
             <a:fld id="{1F0BD816-9A3A-4BB3-9BB4-7DC3AD6D52E8}" type="datetimeFigureOut">
               <a:rPr lang="en-US" smtClean="0"/>
-              <a:t>6/27/2018</a:t>
+              <a:t>6/29/2018</a:t>
             </a:fld>
             <a:endParaRPr lang="en-US"/>
           </a:p>
@@ -8280,7 +8280,7 @@
           <a:p>
             <a:fld id="{1F0BD816-9A3A-4BB3-9BB4-7DC3AD6D52E8}" type="datetimeFigureOut">
               <a:rPr lang="en-US" smtClean="0"/>
-              <a:t>6/27/2018</a:t>
+              <a:t>6/29/2018</a:t>
             </a:fld>
             <a:endParaRPr lang="en-US"/>
           </a:p>
@@ -8488,7 +8488,7 @@
           <a:p>
             <a:fld id="{1F0BD816-9A3A-4BB3-9BB4-7DC3AD6D52E8}" type="datetimeFigureOut">
               <a:rPr lang="en-US" smtClean="0"/>
-              <a:t>6/27/2018</a:t>
+              <a:t>6/29/2018</a:t>
             </a:fld>
             <a:endParaRPr lang="en-US"/>
           </a:p>
@@ -8922,7 +8922,7 @@
           <a:p>
             <a:fld id="{96DFF08F-DC6B-4601-B491-B0F83F6DD2DA}" type="datetimeFigureOut">
               <a:rPr lang="en-US" dirty="0"/>
-              <a:t>6/27/2018</a:t>
+              <a:t>6/29/2018</a:t>
             </a:fld>
             <a:endParaRPr lang="en-US" dirty="0"/>
           </a:p>
@@ -9035,7 +9035,7 @@
           <a:p>
             <a:fld id="{96DFF08F-DC6B-4601-B491-B0F83F6DD2DA}" type="datetimeFigureOut">
               <a:rPr lang="en-US" dirty="0"/>
-              <a:t>6/27/2018</a:t>
+              <a:t>6/29/2018</a:t>
             </a:fld>
             <a:endParaRPr lang="en-US" dirty="0"/>
           </a:p>
@@ -9125,7 +9125,7 @@
           <a:p>
             <a:fld id="{96DFF08F-DC6B-4601-B491-B0F83F6DD2DA}" type="datetimeFigureOut">
               <a:rPr lang="en-US" dirty="0"/>
-              <a:t>6/27/2018</a:t>
+              <a:t>6/29/2018</a:t>
             </a:fld>
             <a:endParaRPr lang="en-US" dirty="0"/>
           </a:p>
@@ -9393,7 +9393,7 @@
           <a:p>
             <a:fld id="{96DFF08F-DC6B-4601-B491-B0F83F6DD2DA}" type="datetimeFigureOut">
               <a:rPr lang="en-US" dirty="0"/>
-              <a:t>6/27/2018</a:t>
+              <a:t>6/29/2018</a:t>
             </a:fld>
             <a:endParaRPr lang="en-US" dirty="0"/>
           </a:p>
@@ -9653,7 +9653,7 @@
           <a:p>
             <a:fld id="{96DFF08F-DC6B-4601-B491-B0F83F6DD2DA}" type="datetimeFigureOut">
               <a:rPr lang="en-US" dirty="0"/>
-              <a:t>6/27/2018</a:t>
+              <a:t>6/29/2018</a:t>
             </a:fld>
             <a:endParaRPr lang="en-US" dirty="0"/>
           </a:p>
@@ -9898,7 +9898,7 @@
             <a:fld id="{96DFF08F-DC6B-4601-B491-B0F83F6DD2DA}" type="datetimeFigureOut">
               <a:rPr lang="en-US" dirty="0"/>
               <a:pPr/>
-              <a:t>6/27/2018</a:t>
+              <a:t>6/29/2018</a:t>
             </a:fld>
             <a:endParaRPr lang="en-US" dirty="0"/>
           </a:p>
@@ -10502,7 +10502,7 @@
           <a:p>
             <a:fld id="{D0634792-6DD7-4E5B-BE1E-FD54681891FB}" type="datetimeFigureOut">
               <a:rPr lang="en-GB" smtClean="0"/>
-              <a:t>27/06/2018</a:t>
+              <a:t>29/06/2018</a:t>
             </a:fld>
             <a:endParaRPr lang="en-GB"/>
           </a:p>
@@ -10986,7 +10986,7 @@
           </a:ln>
           <a:extLst>
             <a:ext uri="{C572A759-6A51-4108-AA02-DFA0A04FC94B}">
-              <ma14:wrappingTextBoxFlag xmlns:ma14="http://schemas.microsoft.com/office/mac/drawingml/2011/main" xmlns="" val="1"/>
+              <ma14:wrappingTextBoxFlag xmlns="" xmlns:ma14="http://schemas.microsoft.com/office/mac/drawingml/2011/main" val="1"/>
             </a:ext>
           </a:extLst>
         </p:spPr>
@@ -11025,7 +11025,7 @@
           </a:ln>
           <a:extLst>
             <a:ext uri="{C572A759-6A51-4108-AA02-DFA0A04FC94B}">
-              <ma14:wrappingTextBoxFlag xmlns:ma14="http://schemas.microsoft.com/office/mac/drawingml/2011/main" xmlns="" val="1"/>
+              <ma14:wrappingTextBoxFlag xmlns="" xmlns:ma14="http://schemas.microsoft.com/office/mac/drawingml/2011/main" val="1"/>
             </a:ext>
           </a:extLst>
         </p:spPr>
@@ -12110,7 +12110,7 @@
           <a:p>
             <a:fld id="{1F0BD816-9A3A-4BB3-9BB4-7DC3AD6D52E8}" type="datetimeFigureOut">
               <a:rPr lang="en-US" smtClean="0"/>
-              <a:t>6/27/2018</a:t>
+              <a:t>6/29/2018</a:t>
             </a:fld>
             <a:endParaRPr lang="en-US"/>
           </a:p>
@@ -13673,7 +13673,7 @@
                 </a:solidFill>
                 <a:latin typeface="Montserrat" panose="02000505000000020004" pitchFamily="2" charset="0"/>
               </a:rPr>
-              <a:t>May meetup venue</a:t>
+              <a:t>June meetup venue</a:t>
             </a:r>
           </a:p>
         </p:txBody>
@@ -14319,7 +14319,7 @@
                 <a:latin typeface="Montserrat" panose="02000505000000020004" pitchFamily="2" charset="0"/>
                 <a:cs typeface="Calibri" panose="020F0502020204030204" pitchFamily="34" charset="0"/>
               </a:rPr>
-              <a:t>Incremental Group are kindly hosting us for our May meetup</a:t>
+              <a:t>Incremental Group are kindly hosting us for our June meetup</a:t>
             </a:r>
           </a:p>
           <a:p>

</xml_diff>